<commit_message>
added link to repo in pptx
</commit_message>
<xml_diff>
--- a/intro to web.pptx
+++ b/intro to web.pptx
@@ -5,28 +5,29 @@
     <p:sldMasterId id="2147483660" r:id="rId1"/>
   </p:sldMasterIdLst>
   <p:notesMasterIdLst>
-    <p:notesMasterId r:id="rId21"/>
+    <p:notesMasterId r:id="rId22"/>
   </p:notesMasterIdLst>
   <p:sldIdLst>
     <p:sldId id="256" r:id="rId2"/>
-    <p:sldId id="259" r:id="rId3"/>
-    <p:sldId id="257" r:id="rId4"/>
-    <p:sldId id="258" r:id="rId5"/>
-    <p:sldId id="260" r:id="rId6"/>
-    <p:sldId id="261" r:id="rId7"/>
-    <p:sldId id="262" r:id="rId8"/>
-    <p:sldId id="269" r:id="rId9"/>
-    <p:sldId id="265" r:id="rId10"/>
-    <p:sldId id="266" r:id="rId11"/>
-    <p:sldId id="268" r:id="rId12"/>
-    <p:sldId id="273" r:id="rId13"/>
-    <p:sldId id="267" r:id="rId14"/>
-    <p:sldId id="270" r:id="rId15"/>
-    <p:sldId id="271" r:id="rId16"/>
-    <p:sldId id="274" r:id="rId17"/>
-    <p:sldId id="275" r:id="rId18"/>
-    <p:sldId id="272" r:id="rId19"/>
-    <p:sldId id="276" r:id="rId20"/>
+    <p:sldId id="277" r:id="rId3"/>
+    <p:sldId id="259" r:id="rId4"/>
+    <p:sldId id="257" r:id="rId5"/>
+    <p:sldId id="258" r:id="rId6"/>
+    <p:sldId id="260" r:id="rId7"/>
+    <p:sldId id="261" r:id="rId8"/>
+    <p:sldId id="262" r:id="rId9"/>
+    <p:sldId id="269" r:id="rId10"/>
+    <p:sldId id="265" r:id="rId11"/>
+    <p:sldId id="266" r:id="rId12"/>
+    <p:sldId id="268" r:id="rId13"/>
+    <p:sldId id="273" r:id="rId14"/>
+    <p:sldId id="267" r:id="rId15"/>
+    <p:sldId id="270" r:id="rId16"/>
+    <p:sldId id="271" r:id="rId17"/>
+    <p:sldId id="274" r:id="rId18"/>
+    <p:sldId id="275" r:id="rId19"/>
+    <p:sldId id="272" r:id="rId20"/>
+    <p:sldId id="276" r:id="rId21"/>
   </p:sldIdLst>
   <p:sldSz cx="12192000" cy="6858000"/>
   <p:notesSz cx="6858000" cy="9144000"/>
@@ -215,7 +216,7 @@
           <a:p>
             <a:fld id="{7C28A56C-B7DC-4B0B-A28E-64830014DEAF}" type="datetimeFigureOut">
               <a:rPr lang="en-US" smtClean="0"/>
-              <a:t>1/18/2018</a:t>
+              <a:t>1/19/2018</a:t>
             </a:fld>
             <a:endParaRPr lang="en-US"/>
           </a:p>
@@ -561,7 +562,7 @@
           <a:p>
             <a:fld id="{AE889E9D-53EF-4B68-80FA-0082D8AB9020}" type="slidenum">
               <a:rPr lang="en-US" smtClean="0"/>
-              <a:t>2</a:t>
+              <a:t>3</a:t>
             </a:fld>
             <a:endParaRPr lang="en-US"/>
           </a:p>
@@ -653,7 +654,7 @@
           <a:p>
             <a:fld id="{AE889E9D-53EF-4B68-80FA-0082D8AB9020}" type="slidenum">
               <a:rPr lang="en-US" smtClean="0"/>
-              <a:t>3</a:t>
+              <a:t>4</a:t>
             </a:fld>
             <a:endParaRPr lang="en-US"/>
           </a:p>
@@ -771,7 +772,7 @@
           <a:p>
             <a:fld id="{AE889E9D-53EF-4B68-80FA-0082D8AB9020}" type="slidenum">
               <a:rPr lang="en-US" smtClean="0"/>
-              <a:t>4</a:t>
+              <a:t>5</a:t>
             </a:fld>
             <a:endParaRPr lang="en-US"/>
           </a:p>
@@ -901,7 +902,7 @@
           <a:p>
             <a:fld id="{AE889E9D-53EF-4B68-80FA-0082D8AB9020}" type="slidenum">
               <a:rPr lang="en-US" smtClean="0"/>
-              <a:t>5</a:t>
+              <a:t>6</a:t>
             </a:fld>
             <a:endParaRPr lang="en-US"/>
           </a:p>
@@ -1017,7 +1018,7 @@
           <a:p>
             <a:fld id="{AE889E9D-53EF-4B68-80FA-0082D8AB9020}" type="slidenum">
               <a:rPr lang="en-US" smtClean="0"/>
-              <a:t>6</a:t>
+              <a:t>7</a:t>
             </a:fld>
             <a:endParaRPr lang="en-US"/>
           </a:p>
@@ -1125,7 +1126,7 @@
           <a:p>
             <a:fld id="{AE889E9D-53EF-4B68-80FA-0082D8AB9020}" type="slidenum">
               <a:rPr lang="en-US" smtClean="0"/>
-              <a:t>7</a:t>
+              <a:t>8</a:t>
             </a:fld>
             <a:endParaRPr lang="en-US"/>
           </a:p>
@@ -1231,7 +1232,7 @@
           <a:p>
             <a:fld id="{AE889E9D-53EF-4B68-80FA-0082D8AB9020}" type="slidenum">
               <a:rPr lang="en-US" smtClean="0"/>
-              <a:t>8</a:t>
+              <a:t>9</a:t>
             </a:fld>
             <a:endParaRPr lang="en-US"/>
           </a:p>
@@ -1315,7 +1316,7 @@
           <a:p>
             <a:fld id="{AE889E9D-53EF-4B68-80FA-0082D8AB9020}" type="slidenum">
               <a:rPr lang="en-US" smtClean="0"/>
-              <a:t>9</a:t>
+              <a:t>10</a:t>
             </a:fld>
             <a:endParaRPr lang="en-US"/>
           </a:p>
@@ -1473,7 +1474,7 @@
           <a:p>
             <a:fld id="{B417B79C-9BEE-4788-8A40-105E29A8A87D}" type="datetimeFigureOut">
               <a:rPr lang="en-US" smtClean="0"/>
-              <a:t>1/18/2018</a:t>
+              <a:t>1/19/2018</a:t>
             </a:fld>
             <a:endParaRPr lang="en-US"/>
           </a:p>
@@ -1651,7 +1652,7 @@
           <a:p>
             <a:fld id="{B417B79C-9BEE-4788-8A40-105E29A8A87D}" type="datetimeFigureOut">
               <a:rPr lang="en-US" smtClean="0"/>
-              <a:t>1/18/2018</a:t>
+              <a:t>1/19/2018</a:t>
             </a:fld>
             <a:endParaRPr lang="en-US"/>
           </a:p>
@@ -1839,7 +1840,7 @@
           <a:p>
             <a:fld id="{B417B79C-9BEE-4788-8A40-105E29A8A87D}" type="datetimeFigureOut">
               <a:rPr lang="en-US" smtClean="0"/>
-              <a:t>1/18/2018</a:t>
+              <a:t>1/19/2018</a:t>
             </a:fld>
             <a:endParaRPr lang="en-US"/>
           </a:p>
@@ -2017,7 +2018,7 @@
           <a:p>
             <a:fld id="{B417B79C-9BEE-4788-8A40-105E29A8A87D}" type="datetimeFigureOut">
               <a:rPr lang="en-US" smtClean="0"/>
-              <a:t>1/18/2018</a:t>
+              <a:t>1/19/2018</a:t>
             </a:fld>
             <a:endParaRPr lang="en-US"/>
           </a:p>
@@ -2271,7 +2272,7 @@
           <a:p>
             <a:fld id="{B417B79C-9BEE-4788-8A40-105E29A8A87D}" type="datetimeFigureOut">
               <a:rPr lang="en-US" smtClean="0"/>
-              <a:t>1/18/2018</a:t>
+              <a:t>1/19/2018</a:t>
             </a:fld>
             <a:endParaRPr lang="en-US"/>
           </a:p>
@@ -2511,7 +2512,7 @@
           <a:p>
             <a:fld id="{B417B79C-9BEE-4788-8A40-105E29A8A87D}" type="datetimeFigureOut">
               <a:rPr lang="en-US" smtClean="0"/>
-              <a:t>1/18/2018</a:t>
+              <a:t>1/19/2018</a:t>
             </a:fld>
             <a:endParaRPr lang="en-US"/>
           </a:p>
@@ -2886,7 +2887,7 @@
           <a:p>
             <a:fld id="{B417B79C-9BEE-4788-8A40-105E29A8A87D}" type="datetimeFigureOut">
               <a:rPr lang="en-US" smtClean="0"/>
-              <a:t>1/18/2018</a:t>
+              <a:t>1/19/2018</a:t>
             </a:fld>
             <a:endParaRPr lang="en-US"/>
           </a:p>
@@ -3012,7 +3013,7 @@
           <a:p>
             <a:fld id="{B417B79C-9BEE-4788-8A40-105E29A8A87D}" type="datetimeFigureOut">
               <a:rPr lang="en-US" smtClean="0"/>
-              <a:t>1/18/2018</a:t>
+              <a:t>1/19/2018</a:t>
             </a:fld>
             <a:endParaRPr lang="en-US"/>
           </a:p>
@@ -3115,7 +3116,7 @@
           <a:p>
             <a:fld id="{B417B79C-9BEE-4788-8A40-105E29A8A87D}" type="datetimeFigureOut">
               <a:rPr lang="en-US" smtClean="0"/>
-              <a:t>1/18/2018</a:t>
+              <a:t>1/19/2018</a:t>
             </a:fld>
             <a:endParaRPr lang="en-US"/>
           </a:p>
@@ -3400,7 +3401,7 @@
           <a:p>
             <a:fld id="{B417B79C-9BEE-4788-8A40-105E29A8A87D}" type="datetimeFigureOut">
               <a:rPr lang="en-US" smtClean="0"/>
-              <a:t>1/18/2018</a:t>
+              <a:t>1/19/2018</a:t>
             </a:fld>
             <a:endParaRPr lang="en-US"/>
           </a:p>
@@ -3665,7 +3666,7 @@
           <a:p>
             <a:fld id="{B417B79C-9BEE-4788-8A40-105E29A8A87D}" type="datetimeFigureOut">
               <a:rPr lang="en-US" smtClean="0"/>
-              <a:t>1/18/2018</a:t>
+              <a:t>1/19/2018</a:t>
             </a:fld>
             <a:endParaRPr lang="en-US"/>
           </a:p>
@@ -3881,7 +3882,7 @@
           <a:p>
             <a:fld id="{B417B79C-9BEE-4788-8A40-105E29A8A87D}" type="datetimeFigureOut">
               <a:rPr lang="en-US" smtClean="0"/>
-              <a:t>1/18/2018</a:t>
+              <a:t>1/19/2018</a:t>
             </a:fld>
             <a:endParaRPr lang="en-US"/>
           </a:p>
@@ -4339,15 +4340,7 @@
           <a:p>
             <a:r>
               <a:rPr lang="en-US" dirty="0" smtClean="0"/>
-              <a:t>An introductory </a:t>
-            </a:r>
-            <a:r>
-              <a:rPr lang="en-US" dirty="0" smtClean="0"/>
-              <a:t>workshop on </a:t>
-            </a:r>
-            <a:r>
-              <a:rPr lang="en-US" dirty="0" smtClean="0"/>
-              <a:t>the basic components of a webpage</a:t>
+              <a:t>An introductory workshop on the basic components of a webpage</a:t>
             </a:r>
             <a:endParaRPr lang="en-US" dirty="0"/>
           </a:p>
@@ -4400,7 +4393,7 @@
           <a:p>
             <a:r>
               <a:rPr lang="en-US" dirty="0" smtClean="0"/>
-              <a:t>CSS Basics</a:t>
+              <a:t>HTML Basics</a:t>
             </a:r>
             <a:endParaRPr lang="en-US" dirty="0"/>
           </a:p>
@@ -4422,75 +4415,46 @@
           <a:lstStyle/>
           <a:p>
             <a:r>
-              <a:rPr lang="en-US" dirty="0"/>
-              <a:t>Manipulating the style of an element </a:t>
-            </a:r>
-            <a:r>
-              <a:rPr lang="en-US" dirty="0" smtClean="0"/>
-              <a:t>directly</a:t>
-            </a:r>
-          </a:p>
-          <a:p>
-            <a:r>
-              <a:rPr lang="en-US" dirty="0" smtClean="0"/>
-              <a:t>Discussing why styling is best when applied broadly</a:t>
-            </a:r>
-            <a:endParaRPr lang="en-US" dirty="0"/>
-          </a:p>
-          <a:p>
-            <a:r>
-              <a:rPr lang="en-US" dirty="0"/>
-              <a:t>Manipulating the style of an element with in-html </a:t>
-            </a:r>
-            <a:r>
-              <a:rPr lang="en-US" dirty="0" err="1"/>
-              <a:t>css</a:t>
-            </a:r>
-            <a:endParaRPr lang="en-US" dirty="0"/>
-          </a:p>
-          <a:p>
-            <a:r>
-              <a:rPr lang="en-US" dirty="0"/>
-              <a:t>Manipulating the style of an element with a </a:t>
-            </a:r>
-            <a:r>
-              <a:rPr lang="en-US" dirty="0" err="1"/>
-              <a:t>css</a:t>
-            </a:r>
-            <a:r>
-              <a:rPr lang="en-US" dirty="0"/>
-              <a:t> </a:t>
-            </a:r>
-            <a:r>
-              <a:rPr lang="en-US" dirty="0" smtClean="0"/>
-              <a:t>file</a:t>
-            </a:r>
-          </a:p>
-          <a:p>
-            <a:r>
-              <a:rPr lang="en-US" dirty="0" smtClean="0"/>
-              <a:t>Discussion about why all of these options exist</a:t>
-            </a:r>
-          </a:p>
-          <a:p>
-            <a:r>
-              <a:rPr lang="en-US" dirty="0" smtClean="0"/>
-              <a:t>Showing a hover element</a:t>
-            </a:r>
-          </a:p>
-          <a:p>
-            <a:r>
-              <a:rPr lang="en-US" dirty="0" smtClean="0"/>
-              <a:t>Explaining what CSS stands for and what its purpose is</a:t>
-            </a:r>
-            <a:endParaRPr lang="en-US" dirty="0"/>
+              <a:rPr lang="en-US" dirty="0" smtClean="0"/>
+              <a:t>Using a text editor to create a file that the browser can read</a:t>
+            </a:r>
+          </a:p>
+          <a:p>
+            <a:r>
+              <a:rPr lang="en-US" dirty="0" smtClean="0"/>
+              <a:t>Inspecting the element in the browser, explaining elements</a:t>
+            </a:r>
+          </a:p>
+          <a:p>
+            <a:r>
+              <a:rPr lang="en-US" dirty="0" smtClean="0"/>
+              <a:t>Recreating the file, this time with actual markup!</a:t>
+            </a:r>
+          </a:p>
+          <a:p>
+            <a:r>
+              <a:rPr lang="en-US" dirty="0" smtClean="0"/>
+              <a:t>Inspecting the element again, showing how it is the same</a:t>
+            </a:r>
+          </a:p>
+          <a:p>
+            <a:r>
+              <a:rPr lang="en-US" dirty="0" smtClean="0"/>
+              <a:t>Explaining what HTML stands for and what its purpose is</a:t>
+            </a:r>
+          </a:p>
+          <a:p>
+            <a:r>
+              <a:rPr lang="en-US" dirty="0" smtClean="0"/>
+              <a:t>Showing what a basic HTML file could look like</a:t>
+            </a:r>
           </a:p>
         </p:txBody>
       </p:sp>
     </p:spTree>
     <p:extLst>
       <p:ext uri="{BB962C8B-B14F-4D97-AF65-F5344CB8AC3E}">
-        <p14:creationId xmlns:p14="http://schemas.microsoft.com/office/powerpoint/2010/main" val="2723469417"/>
+        <p14:creationId xmlns:p14="http://schemas.microsoft.com/office/powerpoint/2010/main" val="3818386909"/>
       </p:ext>
     </p:extLst>
   </p:cSld>
@@ -4534,7 +4498,7 @@
           <a:p>
             <a:r>
               <a:rPr lang="en-US" dirty="0" smtClean="0"/>
-              <a:t>CSS Basics 2.0</a:t>
+              <a:t>CSS Basics</a:t>
             </a:r>
             <a:endParaRPr lang="en-US" dirty="0"/>
           </a:p>
@@ -4556,41 +4520,66 @@
           <a:lstStyle/>
           <a:p>
             <a:r>
-              <a:rPr lang="en-US" dirty="0" smtClean="0"/>
-              <a:t>All in one file: explain each element, one at a time</a:t>
-            </a:r>
-          </a:p>
-          <a:p>
-            <a:r>
-              <a:rPr lang="en-US" dirty="0" smtClean="0"/>
-              <a:t>Showing how the cascading works: parent is styled one way and the child is also styled</a:t>
-            </a:r>
-          </a:p>
-          <a:p>
-            <a:r>
-              <a:rPr lang="en-US" dirty="0" smtClean="0"/>
-              <a:t>Showing how child with different styling will not inherit</a:t>
-            </a:r>
-          </a:p>
-          <a:p>
-            <a:r>
-              <a:rPr lang="en-US" dirty="0" smtClean="0"/>
-              <a:t>Showing how an in-line styling overrides the </a:t>
-            </a:r>
-            <a:r>
-              <a:rPr lang="en-US" dirty="0" err="1" smtClean="0"/>
+              <a:rPr lang="en-US" dirty="0"/>
+              <a:t>Manipulating the style of an element </a:t>
+            </a:r>
+            <a:r>
+              <a:rPr lang="en-US" dirty="0" smtClean="0"/>
+              <a:t>directly</a:t>
+            </a:r>
+          </a:p>
+          <a:p>
+            <a:r>
+              <a:rPr lang="en-US" dirty="0" smtClean="0"/>
+              <a:t>Discussing why styling is best when applied broadly</a:t>
+            </a:r>
+            <a:endParaRPr lang="en-US" dirty="0"/>
+          </a:p>
+          <a:p>
+            <a:r>
+              <a:rPr lang="en-US" dirty="0"/>
+              <a:t>Manipulating the style of an element with in-html </a:t>
+            </a:r>
+            <a:r>
+              <a:rPr lang="en-US" dirty="0" err="1"/>
               <a:t>css</a:t>
             </a:r>
-            <a:endParaRPr lang="en-US" dirty="0" smtClean="0"/>
-          </a:p>
-          <a:p>
-            <a:r>
-              <a:rPr lang="en-US" dirty="0" smtClean="0"/>
-              <a:t>Showing how an ID element overrides the </a:t>
-            </a:r>
-            <a:r>
-              <a:rPr lang="en-US" dirty="0" err="1" smtClean="0"/>
+            <a:endParaRPr lang="en-US" dirty="0"/>
+          </a:p>
+          <a:p>
+            <a:r>
+              <a:rPr lang="en-US" dirty="0"/>
+              <a:t>Manipulating the style of an element with a </a:t>
+            </a:r>
+            <a:r>
+              <a:rPr lang="en-US" dirty="0" err="1"/>
               <a:t>css</a:t>
+            </a:r>
+            <a:r>
+              <a:rPr lang="en-US" dirty="0"/>
+              <a:t> </a:t>
+            </a:r>
+            <a:r>
+              <a:rPr lang="en-US" dirty="0" smtClean="0"/>
+              <a:t>file</a:t>
+            </a:r>
+          </a:p>
+          <a:p>
+            <a:r>
+              <a:rPr lang="en-US" dirty="0" smtClean="0"/>
+              <a:t>Discussion about why all of these options exist</a:t>
+            </a:r>
+          </a:p>
+          <a:p>
+            <a:r>
+              <a:rPr lang="en-US" dirty="0" smtClean="0"/>
+              <a:t>Showing a hover element</a:t>
+            </a:r>
+          </a:p>
+          <a:p>
+            <a:r>
+              <a:rPr lang="en-US" dirty="0" smtClean="0"/>
+              <a:t>Explaining what CSS stands for and what its purpose is</a:t>
             </a:r>
             <a:endParaRPr lang="en-US" dirty="0"/>
           </a:p>
@@ -4599,7 +4588,7 @@
     </p:spTree>
     <p:extLst>
       <p:ext uri="{BB962C8B-B14F-4D97-AF65-F5344CB8AC3E}">
-        <p14:creationId xmlns:p14="http://schemas.microsoft.com/office/powerpoint/2010/main" val="460696276"/>
+        <p14:creationId xmlns:p14="http://schemas.microsoft.com/office/powerpoint/2010/main" val="2723469417"/>
       </p:ext>
     </p:extLst>
   </p:cSld>
@@ -4643,7 +4632,7 @@
           <a:p>
             <a:r>
               <a:rPr lang="en-US" dirty="0" smtClean="0"/>
-              <a:t>Challenge #1</a:t>
+              <a:t>CSS Basics 2.0</a:t>
             </a:r>
             <a:endParaRPr lang="en-US" dirty="0"/>
           </a:p>
@@ -4659,76 +4648,48 @@
             <p:ph idx="1"/>
           </p:nvPr>
         </p:nvSpPr>
-        <p:spPr>
-          <a:xfrm>
-            <a:off x="508000" y="1825625"/>
-            <a:ext cx="11074400" cy="4863042"/>
-          </a:xfrm>
-        </p:spPr>
-        <p:txBody>
-          <a:bodyPr/>
-          <a:lstStyle/>
-          <a:p>
-            <a:r>
-              <a:rPr lang="en-US" dirty="0" smtClean="0"/>
-              <a:t>Build a 250x250 pixel element with a 150x150 pixel element inside</a:t>
-            </a:r>
-          </a:p>
-          <a:p>
-            <a:pPr lvl="1"/>
-            <a:r>
-              <a:rPr lang="en-US" dirty="0" smtClean="0"/>
-              <a:t>Tip: Try using a “div” element &lt;div&gt;, give them borders so we can see</a:t>
-            </a:r>
-          </a:p>
-          <a:p>
-            <a:r>
-              <a:rPr lang="en-US" dirty="0" smtClean="0"/>
-              <a:t>Style these using a CSS document, not inline HTML</a:t>
-            </a:r>
-          </a:p>
-          <a:p>
-            <a:pPr lvl="1"/>
-            <a:r>
-              <a:rPr lang="en-US" dirty="0" smtClean="0"/>
-              <a:t>Use classes, not IDs to accomplish this</a:t>
-            </a:r>
-          </a:p>
-          <a:p>
-            <a:r>
-              <a:rPr lang="en-US" dirty="0" smtClean="0"/>
-              <a:t>Make the 250 pixel element change color on hover and the 150 pixel element change grow larger on hover</a:t>
-            </a:r>
-          </a:p>
-          <a:p>
-            <a:r>
-              <a:rPr lang="en-US" dirty="0" smtClean="0"/>
-              <a:t>Bonus:</a:t>
-            </a:r>
-          </a:p>
-          <a:p>
-            <a:pPr lvl="1"/>
-            <a:r>
-              <a:rPr lang="en-US" dirty="0" smtClean="0"/>
-              <a:t>Make the element’s </a:t>
-            </a:r>
-            <a:r>
-              <a:rPr lang="en-US" i="1" dirty="0" smtClean="0"/>
-              <a:t>maximum</a:t>
-            </a:r>
-            <a:r>
-              <a:rPr lang="en-US" dirty="0" smtClean="0"/>
-              <a:t> size 250, but it will shrink in size if the browser shrinks in size (this is called responsive design)</a:t>
-            </a:r>
-          </a:p>
-          <a:p>
-            <a:pPr lvl="1"/>
-            <a:r>
-              <a:rPr lang="en-US" dirty="0" smtClean="0"/>
-              <a:t>Make the inner element’s size a % of the outer element</a:t>
-            </a:r>
-          </a:p>
-          <a:p>
+        <p:spPr/>
+        <p:txBody>
+          <a:bodyPr/>
+          <a:lstStyle/>
+          <a:p>
+            <a:r>
+              <a:rPr lang="en-US" dirty="0" smtClean="0"/>
+              <a:t>All in one file: explain each element, one at a time</a:t>
+            </a:r>
+          </a:p>
+          <a:p>
+            <a:r>
+              <a:rPr lang="en-US" dirty="0" smtClean="0"/>
+              <a:t>Showing how the cascading works: parent is styled one way and the child is also styled</a:t>
+            </a:r>
+          </a:p>
+          <a:p>
+            <a:r>
+              <a:rPr lang="en-US" dirty="0" smtClean="0"/>
+              <a:t>Showing how child with different styling will not inherit</a:t>
+            </a:r>
+          </a:p>
+          <a:p>
+            <a:r>
+              <a:rPr lang="en-US" dirty="0" smtClean="0"/>
+              <a:t>Showing how an in-line styling overrides the </a:t>
+            </a:r>
+            <a:r>
+              <a:rPr lang="en-US" dirty="0" err="1" smtClean="0"/>
+              <a:t>css</a:t>
+            </a:r>
+            <a:endParaRPr lang="en-US" dirty="0" smtClean="0"/>
+          </a:p>
+          <a:p>
+            <a:r>
+              <a:rPr lang="en-US" dirty="0" smtClean="0"/>
+              <a:t>Showing how an ID element overrides the </a:t>
+            </a:r>
+            <a:r>
+              <a:rPr lang="en-US" dirty="0" err="1" smtClean="0"/>
+              <a:t>css</a:t>
+            </a:r>
             <a:endParaRPr lang="en-US" dirty="0"/>
           </a:p>
         </p:txBody>
@@ -4736,7 +4697,7 @@
     </p:spTree>
     <p:extLst>
       <p:ext uri="{BB962C8B-B14F-4D97-AF65-F5344CB8AC3E}">
-        <p14:creationId xmlns:p14="http://schemas.microsoft.com/office/powerpoint/2010/main" val="1946294190"/>
+        <p14:creationId xmlns:p14="http://schemas.microsoft.com/office/powerpoint/2010/main" val="460696276"/>
       </p:ext>
     </p:extLst>
   </p:cSld>
@@ -4780,7 +4741,7 @@
           <a:p>
             <a:r>
               <a:rPr lang="en-US" dirty="0" smtClean="0"/>
-              <a:t>Scraping Basics</a:t>
+              <a:t>Challenge #1</a:t>
             </a:r>
             <a:endParaRPr lang="en-US" dirty="0"/>
           </a:p>
@@ -4796,43 +4757,76 @@
             <p:ph idx="1"/>
           </p:nvPr>
         </p:nvSpPr>
-        <p:spPr/>
-        <p:txBody>
-          <a:bodyPr/>
-          <a:lstStyle/>
-          <a:p>
-            <a:r>
-              <a:rPr lang="en-US" dirty="0" smtClean="0"/>
-              <a:t>Showing how easy it is to “extract” html data</a:t>
-            </a:r>
-          </a:p>
-          <a:p>
-            <a:r>
-              <a:rPr lang="en-US" dirty="0" smtClean="0"/>
-              <a:t>Showing how easy it is to “extract” </a:t>
-            </a:r>
-            <a:r>
-              <a:rPr lang="en-US" dirty="0" err="1" smtClean="0"/>
-              <a:t>css</a:t>
-            </a:r>
-            <a:r>
-              <a:rPr lang="en-US" dirty="0" smtClean="0"/>
-              <a:t> data</a:t>
-            </a:r>
-          </a:p>
-          <a:p>
-            <a:r>
-              <a:rPr lang="en-US" dirty="0" smtClean="0"/>
-              <a:t>Show how to manipulate </a:t>
-            </a:r>
-            <a:r>
-              <a:rPr lang="en-US" dirty="0" err="1" smtClean="0"/>
-              <a:t>css</a:t>
-            </a:r>
-            <a:r>
-              <a:rPr lang="en-US" dirty="0" smtClean="0"/>
-              <a:t> or html directly through the DOM</a:t>
-            </a:r>
+        <p:spPr>
+          <a:xfrm>
+            <a:off x="508000" y="1825625"/>
+            <a:ext cx="11074400" cy="4863042"/>
+          </a:xfrm>
+        </p:spPr>
+        <p:txBody>
+          <a:bodyPr/>
+          <a:lstStyle/>
+          <a:p>
+            <a:r>
+              <a:rPr lang="en-US" dirty="0" smtClean="0"/>
+              <a:t>Build a 250x250 pixel element with a 150x150 pixel element inside</a:t>
+            </a:r>
+          </a:p>
+          <a:p>
+            <a:pPr lvl="1"/>
+            <a:r>
+              <a:rPr lang="en-US" dirty="0" smtClean="0"/>
+              <a:t>Tip: Try using a “div” element &lt;div&gt;, give them borders so we can see</a:t>
+            </a:r>
+          </a:p>
+          <a:p>
+            <a:r>
+              <a:rPr lang="en-US" dirty="0" smtClean="0"/>
+              <a:t>Style these using a CSS document, not inline HTML</a:t>
+            </a:r>
+          </a:p>
+          <a:p>
+            <a:pPr lvl="1"/>
+            <a:r>
+              <a:rPr lang="en-US" dirty="0" smtClean="0"/>
+              <a:t>Use classes, not IDs to accomplish this</a:t>
+            </a:r>
+          </a:p>
+          <a:p>
+            <a:r>
+              <a:rPr lang="en-US" dirty="0" smtClean="0"/>
+              <a:t>Make the 250 pixel element change color on hover and the 150 pixel element change grow larger on hover</a:t>
+            </a:r>
+          </a:p>
+          <a:p>
+            <a:r>
+              <a:rPr lang="en-US" dirty="0" smtClean="0"/>
+              <a:t>Bonus:</a:t>
+            </a:r>
+          </a:p>
+          <a:p>
+            <a:pPr lvl="1"/>
+            <a:r>
+              <a:rPr lang="en-US" dirty="0" smtClean="0"/>
+              <a:t>Make the element’s </a:t>
+            </a:r>
+            <a:r>
+              <a:rPr lang="en-US" i="1" dirty="0" smtClean="0"/>
+              <a:t>maximum</a:t>
+            </a:r>
+            <a:r>
+              <a:rPr lang="en-US" dirty="0" smtClean="0"/>
+              <a:t> size 250, but it will shrink in size if the browser shrinks in size (this is called responsive design)</a:t>
+            </a:r>
+          </a:p>
+          <a:p>
+            <a:pPr lvl="1"/>
+            <a:r>
+              <a:rPr lang="en-US" dirty="0" smtClean="0"/>
+              <a:t>Make the inner element’s size a % of the outer element</a:t>
+            </a:r>
+          </a:p>
+          <a:p>
             <a:endParaRPr lang="en-US" dirty="0"/>
           </a:p>
         </p:txBody>
@@ -4840,7 +4834,7 @@
     </p:spTree>
     <p:extLst>
       <p:ext uri="{BB962C8B-B14F-4D97-AF65-F5344CB8AC3E}">
-        <p14:creationId xmlns:p14="http://schemas.microsoft.com/office/powerpoint/2010/main" val="3448334027"/>
+        <p14:creationId xmlns:p14="http://schemas.microsoft.com/office/powerpoint/2010/main" val="1946294190"/>
       </p:ext>
     </p:extLst>
   </p:cSld>
@@ -4884,7 +4878,7 @@
           <a:p>
             <a:r>
               <a:rPr lang="en-US" dirty="0" smtClean="0"/>
-              <a:t>Explain the DOM and Console: your best friends</a:t>
+              <a:t>Scraping Basics</a:t>
             </a:r>
             <a:endParaRPr lang="en-US" dirty="0"/>
           </a:p>
@@ -4907,19 +4901,35 @@
           <a:p>
             <a:r>
               <a:rPr lang="en-US" dirty="0" smtClean="0"/>
-              <a:t>Show the inspection properties for an element and talk about what that means</a:t>
-            </a:r>
-          </a:p>
-          <a:p>
-            <a:r>
-              <a:rPr lang="en-US" dirty="0" smtClean="0"/>
-              <a:t>Show where the console is</a:t>
-            </a:r>
-          </a:p>
-          <a:p>
-            <a:r>
-              <a:rPr lang="en-US" dirty="0" smtClean="0"/>
-              <a:t>Type a few things into the console</a:t>
+              <a:t>Showing how easy it is to “extract” html data</a:t>
+            </a:r>
+          </a:p>
+          <a:p>
+            <a:r>
+              <a:rPr lang="en-US" dirty="0" smtClean="0"/>
+              <a:t>Showing how easy it is to “extract” </a:t>
+            </a:r>
+            <a:r>
+              <a:rPr lang="en-US" dirty="0" err="1" smtClean="0"/>
+              <a:t>css</a:t>
+            </a:r>
+            <a:r>
+              <a:rPr lang="en-US" dirty="0" smtClean="0"/>
+              <a:t> data</a:t>
+            </a:r>
+          </a:p>
+          <a:p>
+            <a:r>
+              <a:rPr lang="en-US" dirty="0" smtClean="0"/>
+              <a:t>Show how to manipulate </a:t>
+            </a:r>
+            <a:r>
+              <a:rPr lang="en-US" dirty="0" err="1" smtClean="0"/>
+              <a:t>css</a:t>
+            </a:r>
+            <a:r>
+              <a:rPr lang="en-US" dirty="0" smtClean="0"/>
+              <a:t> or html directly through the DOM</a:t>
             </a:r>
             <a:endParaRPr lang="en-US" dirty="0"/>
           </a:p>
@@ -4928,7 +4938,7 @@
     </p:spTree>
     <p:extLst>
       <p:ext uri="{BB962C8B-B14F-4D97-AF65-F5344CB8AC3E}">
-        <p14:creationId xmlns:p14="http://schemas.microsoft.com/office/powerpoint/2010/main" val="528912967"/>
+        <p14:creationId xmlns:p14="http://schemas.microsoft.com/office/powerpoint/2010/main" val="3448334027"/>
       </p:ext>
     </p:extLst>
   </p:cSld>
@@ -4972,7 +4982,7 @@
           <a:p>
             <a:r>
               <a:rPr lang="en-US" dirty="0" smtClean="0"/>
-              <a:t>JavaScript Basics</a:t>
+              <a:t>Explain the DOM and Console: your best friends</a:t>
             </a:r>
             <a:endParaRPr lang="en-US" dirty="0"/>
           </a:p>
@@ -4990,72 +5000,33 @@
         </p:nvSpPr>
         <p:spPr/>
         <p:txBody>
-          <a:bodyPr>
-            <a:normAutofit/>
-          </a:bodyPr>
-          <a:lstStyle/>
-          <a:p>
-            <a:r>
-              <a:rPr lang="en-US" dirty="0" smtClean="0"/>
-              <a:t>JS documentation is deep and varied, and different browser companies will document their own usage</a:t>
-            </a:r>
-          </a:p>
-          <a:p>
-            <a:r>
-              <a:rPr lang="en-US" dirty="0" smtClean="0"/>
-              <a:t>The best for web standards is Mozilla’s documentation at MDN (they show references to ECMAScript)</a:t>
-            </a:r>
-          </a:p>
-          <a:p>
-            <a:r>
-              <a:rPr lang="en-US" dirty="0" err="1" smtClean="0"/>
-              <a:t>Javascript</a:t>
-            </a:r>
-            <a:r>
-              <a:rPr lang="en-US" dirty="0" smtClean="0"/>
-              <a:t> is used in Node, electron, adobe acrobat, and Apache’s </a:t>
-            </a:r>
-            <a:r>
-              <a:rPr lang="en-US" dirty="0" err="1" smtClean="0"/>
-              <a:t>CouchDB</a:t>
-            </a:r>
-            <a:r>
-              <a:rPr lang="en-US" dirty="0" smtClean="0"/>
-              <a:t> (not just web pages!)</a:t>
-            </a:r>
-          </a:p>
-          <a:p>
-            <a:r>
-              <a:rPr lang="en-US" dirty="0" err="1" smtClean="0"/>
-              <a:t>JSFiddle</a:t>
-            </a:r>
-            <a:r>
-              <a:rPr lang="en-US" dirty="0" smtClean="0"/>
-              <a:t> (or </a:t>
-            </a:r>
-            <a:r>
-              <a:rPr lang="en-US" dirty="0" err="1" smtClean="0"/>
-              <a:t>JSBin</a:t>
-            </a:r>
-            <a:r>
-              <a:rPr lang="en-US" dirty="0" smtClean="0"/>
-              <a:t>) are the best for live-testing </a:t>
-            </a:r>
-            <a:r>
-              <a:rPr lang="en-US" dirty="0" err="1" smtClean="0"/>
-              <a:t>js</a:t>
-            </a:r>
-            <a:r>
-              <a:rPr lang="en-US" dirty="0" smtClean="0"/>
-              <a:t> in small functions or snippets</a:t>
-            </a:r>
+          <a:bodyPr/>
+          <a:lstStyle/>
+          <a:p>
+            <a:r>
+              <a:rPr lang="en-US" dirty="0" smtClean="0"/>
+              <a:t>Show the inspection properties for an element and talk about what that means</a:t>
+            </a:r>
+          </a:p>
+          <a:p>
+            <a:r>
+              <a:rPr lang="en-US" dirty="0" smtClean="0"/>
+              <a:t>Show where the console is</a:t>
+            </a:r>
+          </a:p>
+          <a:p>
+            <a:r>
+              <a:rPr lang="en-US" dirty="0" smtClean="0"/>
+              <a:t>Type a few things into the console</a:t>
+            </a:r>
+            <a:endParaRPr lang="en-US" dirty="0"/>
           </a:p>
         </p:txBody>
       </p:sp>
     </p:spTree>
     <p:extLst>
       <p:ext uri="{BB962C8B-B14F-4D97-AF65-F5344CB8AC3E}">
-        <p14:creationId xmlns:p14="http://schemas.microsoft.com/office/powerpoint/2010/main" val="1740952018"/>
+        <p14:creationId xmlns:p14="http://schemas.microsoft.com/office/powerpoint/2010/main" val="528912967"/>
       </p:ext>
     </p:extLst>
   </p:cSld>
@@ -5099,7 +5070,7 @@
           <a:p>
             <a:r>
               <a:rPr lang="en-US" dirty="0" smtClean="0"/>
-              <a:t>JavaScript 2.0</a:t>
+              <a:t>JavaScript Basics</a:t>
             </a:r>
             <a:endParaRPr lang="en-US" dirty="0"/>
           </a:p>
@@ -5117,71 +5088,72 @@
         </p:nvSpPr>
         <p:spPr/>
         <p:txBody>
-          <a:bodyPr/>
-          <a:lstStyle/>
-          <a:p>
-            <a:r>
-              <a:rPr lang="en-US" dirty="0" smtClean="0"/>
-              <a:t>Write to the “document” using JS &amp; the console</a:t>
-            </a:r>
-          </a:p>
-          <a:p>
-            <a:r>
-              <a:rPr lang="en-US" dirty="0" smtClean="0"/>
-              <a:t>Inspect the element in HTML/CSS</a:t>
-            </a:r>
-          </a:p>
-          <a:p>
-            <a:r>
-              <a:rPr lang="en-US" dirty="0" smtClean="0"/>
-              <a:t>Access the element using JavaScript</a:t>
-            </a:r>
-          </a:p>
-          <a:p>
-            <a:r>
-              <a:rPr lang="en-US" dirty="0" smtClean="0"/>
-              <a:t>View the properties of the element in the console</a:t>
-            </a:r>
-          </a:p>
-          <a:p>
-            <a:r>
-              <a:rPr lang="en-US" dirty="0" smtClean="0"/>
-              <a:t>Edit the </a:t>
-            </a:r>
+          <a:bodyPr>
+            <a:normAutofit/>
+          </a:bodyPr>
+          <a:lstStyle/>
+          <a:p>
+            <a:r>
+              <a:rPr lang="en-US" dirty="0" smtClean="0"/>
+              <a:t>JS documentation is deep and varied, and different browser companies will document their own usage</a:t>
+            </a:r>
+          </a:p>
+          <a:p>
+            <a:r>
+              <a:rPr lang="en-US" dirty="0" smtClean="0"/>
+              <a:t>The best for web standards is Mozilla’s documentation at MDN (they show references to ECMAScript)</a:t>
+            </a:r>
+          </a:p>
+          <a:p>
             <a:r>
               <a:rPr lang="en-US" dirty="0" err="1" smtClean="0"/>
-              <a:t>innerhtml</a:t>
-            </a:r>
-            <a:r>
-              <a:rPr lang="en-US" dirty="0" smtClean="0"/>
-              <a:t> of the element</a:t>
-            </a:r>
-          </a:p>
-          <a:p>
-            <a:r>
-              <a:rPr lang="en-US" dirty="0" smtClean="0"/>
-              <a:t>Create a new element using JavaScript</a:t>
-            </a:r>
-          </a:p>
-          <a:p>
-            <a:r>
-              <a:rPr lang="en-US" dirty="0" smtClean="0"/>
-              <a:t>Assign a class to the new element</a:t>
-            </a:r>
-          </a:p>
-          <a:p>
-            <a:r>
-              <a:rPr lang="en-US" dirty="0" smtClean="0"/>
-              <a:t>Adjust the style using JavaScript, show it as inline</a:t>
-            </a:r>
-            <a:endParaRPr lang="en-US" dirty="0"/>
+              <a:t>Javascript</a:t>
+            </a:r>
+            <a:r>
+              <a:rPr lang="en-US" dirty="0" smtClean="0"/>
+              <a:t> is used in Node, electron, adobe acrobat, and Apache’s </a:t>
+            </a:r>
+            <a:r>
+              <a:rPr lang="en-US" dirty="0" err="1" smtClean="0"/>
+              <a:t>CouchDB</a:t>
+            </a:r>
+            <a:r>
+              <a:rPr lang="en-US" dirty="0" smtClean="0"/>
+              <a:t> (not just web pages!)</a:t>
+            </a:r>
+          </a:p>
+          <a:p>
+            <a:r>
+              <a:rPr lang="en-US" dirty="0" err="1" smtClean="0"/>
+              <a:t>JSFiddle</a:t>
+            </a:r>
+            <a:r>
+              <a:rPr lang="en-US" dirty="0" smtClean="0"/>
+              <a:t> (or </a:t>
+            </a:r>
+            <a:r>
+              <a:rPr lang="en-US" dirty="0" err="1" smtClean="0"/>
+              <a:t>JSBin</a:t>
+            </a:r>
+            <a:r>
+              <a:rPr lang="en-US" dirty="0" smtClean="0"/>
+              <a:t>) are the best for live-testing </a:t>
+            </a:r>
+            <a:r>
+              <a:rPr lang="en-US" dirty="0" err="1" smtClean="0"/>
+              <a:t>js</a:t>
+            </a:r>
+            <a:r>
+              <a:rPr lang="en-US" dirty="0" smtClean="0"/>
+              <a:t> in small functions or snippets</a:t>
+            </a:r>
           </a:p>
         </p:txBody>
       </p:sp>
     </p:spTree>
     <p:extLst>
       <p:ext uri="{BB962C8B-B14F-4D97-AF65-F5344CB8AC3E}">
-        <p14:creationId xmlns:p14="http://schemas.microsoft.com/office/powerpoint/2010/main" val="20389981"/>
+        <p14:creationId xmlns:p14="http://schemas.microsoft.com/office/powerpoint/2010/main" val="1740952018"/>
       </p:ext>
     </p:extLst>
   </p:cSld>
@@ -5225,7 +5197,7 @@
           <a:p>
             <a:r>
               <a:rPr lang="en-US" dirty="0" smtClean="0"/>
-              <a:t>Challenge #2</a:t>
+              <a:t>JavaScript 2.0</a:t>
             </a:r>
             <a:endParaRPr lang="en-US" dirty="0"/>
           </a:p>
@@ -5248,46 +5220,66 @@
           <a:p>
             <a:r>
               <a:rPr lang="en-US" dirty="0" smtClean="0"/>
-              <a:t>Go to google.com</a:t>
-            </a:r>
-          </a:p>
-          <a:p>
-            <a:r>
-              <a:rPr lang="en-US" dirty="0" smtClean="0"/>
-              <a:t>Change the background color to “</a:t>
+              <a:t>Write to the “document” using JS &amp; the console</a:t>
+            </a:r>
+          </a:p>
+          <a:p>
+            <a:r>
+              <a:rPr lang="en-US" dirty="0" smtClean="0"/>
+              <a:t>Inspect the element in HTML/CSS</a:t>
+            </a:r>
+          </a:p>
+          <a:p>
+            <a:r>
+              <a:rPr lang="en-US" dirty="0" smtClean="0"/>
+              <a:t>Access the element using JavaScript</a:t>
+            </a:r>
+          </a:p>
+          <a:p>
+            <a:r>
+              <a:rPr lang="en-US" dirty="0" smtClean="0"/>
+              <a:t>View the properties of the element in the console</a:t>
+            </a:r>
+          </a:p>
+          <a:p>
+            <a:r>
+              <a:rPr lang="en-US" dirty="0" smtClean="0"/>
+              <a:t>Edit the </a:t>
             </a:r>
             <a:r>
               <a:rPr lang="en-US" dirty="0" err="1" smtClean="0"/>
-              <a:t>lemonchiffon</a:t>
-            </a:r>
-            <a:r>
-              <a:rPr lang="en-US" dirty="0" smtClean="0"/>
-              <a:t>”</a:t>
-            </a:r>
-          </a:p>
-          <a:p>
-            <a:r>
-              <a:rPr lang="en-US" dirty="0" smtClean="0"/>
-              <a:t>Change the header image to this image:</a:t>
-            </a:r>
-          </a:p>
-          <a:p>
-            <a:pPr lvl="1"/>
-            <a:r>
-              <a:rPr lang="en-US" dirty="0"/>
-              <a:t>http://</a:t>
-            </a:r>
-            <a:r>
-              <a:rPr lang="en-US" dirty="0" smtClean="0"/>
-              <a:t>bit.ly/2rdwZYJ</a:t>
-            </a:r>
+              <a:t>innerhtml</a:t>
+            </a:r>
+            <a:r>
+              <a:rPr lang="en-US" dirty="0" smtClean="0"/>
+              <a:t> of the element</a:t>
+            </a:r>
+          </a:p>
+          <a:p>
+            <a:r>
+              <a:rPr lang="en-US" dirty="0" smtClean="0"/>
+              <a:t>Create a new element using JavaScript</a:t>
+            </a:r>
+          </a:p>
+          <a:p>
+            <a:r>
+              <a:rPr lang="en-US" dirty="0" smtClean="0"/>
+              <a:t>Assign a class to the new element</a:t>
+            </a:r>
+          </a:p>
+          <a:p>
+            <a:r>
+              <a:rPr lang="en-US" dirty="0" smtClean="0"/>
+              <a:t>Adjust the style using JavaScript, show it as inline</a:t>
+            </a:r>
+            <a:endParaRPr lang="en-US" dirty="0"/>
           </a:p>
         </p:txBody>
       </p:sp>
     </p:spTree>
     <p:extLst>
       <p:ext uri="{BB962C8B-B14F-4D97-AF65-F5344CB8AC3E}">
-        <p14:creationId xmlns:p14="http://schemas.microsoft.com/office/powerpoint/2010/main" val="4192706341"/>
+        <p14:creationId xmlns:p14="http://schemas.microsoft.com/office/powerpoint/2010/main" val="20389981"/>
       </p:ext>
     </p:extLst>
   </p:cSld>
@@ -5330,80 +5322,70 @@
           <a:lstStyle/>
           <a:p>
             <a:r>
+              <a:rPr lang="en-US" dirty="0" smtClean="0"/>
+              <a:t>Challenge #2</a:t>
+            </a:r>
+            <a:endParaRPr lang="en-US" dirty="0"/>
+          </a:p>
+        </p:txBody>
+      </p:sp>
+      <p:sp>
+        <p:nvSpPr>
+          <p:cNvPr id="3" name="Content Placeholder 2"/>
+          <p:cNvSpPr>
+            <a:spLocks noGrp="1"/>
+          </p:cNvSpPr>
+          <p:nvPr>
+            <p:ph idx="1"/>
+          </p:nvPr>
+        </p:nvSpPr>
+        <p:spPr/>
+        <p:txBody>
+          <a:bodyPr/>
+          <a:lstStyle/>
+          <a:p>
+            <a:r>
+              <a:rPr lang="en-US" dirty="0" smtClean="0"/>
+              <a:t>Go to google.com</a:t>
+            </a:r>
+          </a:p>
+          <a:p>
+            <a:r>
+              <a:rPr lang="en-US" dirty="0" smtClean="0"/>
+              <a:t>Change the background color to “</a:t>
+            </a:r>
+            <a:r>
               <a:rPr lang="en-US" dirty="0" err="1" smtClean="0"/>
-              <a:t>Javascript</a:t>
-            </a:r>
-            <a:r>
-              <a:rPr lang="en-US" dirty="0" smtClean="0"/>
-              <a:t> basics 3.0</a:t>
-            </a:r>
-            <a:endParaRPr lang="en-US" dirty="0"/>
-          </a:p>
-        </p:txBody>
-      </p:sp>
-      <p:sp>
-        <p:nvSpPr>
-          <p:cNvPr id="3" name="Content Placeholder 2"/>
-          <p:cNvSpPr>
-            <a:spLocks noGrp="1"/>
-          </p:cNvSpPr>
-          <p:nvPr>
-            <p:ph idx="1"/>
-          </p:nvPr>
-        </p:nvSpPr>
-        <p:spPr/>
-        <p:txBody>
-          <a:bodyPr/>
-          <a:lstStyle/>
-          <a:p>
+              <a:t>lemonchiffon</a:t>
+            </a:r>
+            <a:r>
+              <a:rPr lang="en-US" dirty="0" smtClean="0"/>
+              <a:t>”</a:t>
+            </a:r>
+          </a:p>
+          <a:p>
+            <a:r>
+              <a:rPr lang="en-US" dirty="0" smtClean="0"/>
+              <a:t>Change the header image to this image:</a:t>
+            </a:r>
+          </a:p>
+          <a:p>
+            <a:pPr lvl="1"/>
             <a:r>
               <a:rPr lang="en-US" dirty="0"/>
-              <a:t>Show basic buttons and looping and the differences of html-triggered JS, event binding, and event listening</a:t>
-            </a:r>
-          </a:p>
-          <a:p>
-            <a:r>
-              <a:rPr lang="en-US" dirty="0"/>
-              <a:t>Show event triggers passing as parameters</a:t>
-            </a:r>
-          </a:p>
-          <a:p>
-            <a:r>
-              <a:rPr lang="en-US" dirty="0"/>
-              <a:t>Explain how </a:t>
-            </a:r>
-            <a:r>
-              <a:rPr lang="en-US" dirty="0" err="1"/>
-              <a:t>Javascript</a:t>
-            </a:r>
-            <a:r>
-              <a:rPr lang="en-US" dirty="0"/>
-              <a:t> passes some parameters explicitly (you just have to learn what these are</a:t>
-            </a:r>
-          </a:p>
-          <a:p>
-            <a:r>
-              <a:rPr lang="en-US" dirty="0"/>
-              <a:t>Show the problem with triggering events on parent </a:t>
-            </a:r>
-            <a:r>
-              <a:rPr lang="en-US" dirty="0" smtClean="0"/>
-              <a:t>elements</a:t>
-            </a:r>
-          </a:p>
-          <a:p>
-            <a:r>
-              <a:rPr lang="en-US" dirty="0" smtClean="0"/>
-              <a:t>Build a basic form with a text input and submit button</a:t>
-            </a:r>
-            <a:endParaRPr lang="en-US" dirty="0"/>
+              <a:t>http://</a:t>
+            </a:r>
+            <a:r>
+              <a:rPr lang="en-US" dirty="0" smtClean="0"/>
+              <a:t>bit.ly/2rdwZYJ</a:t>
+            </a:r>
           </a:p>
         </p:txBody>
       </p:sp>
     </p:spTree>
     <p:extLst>
       <p:ext uri="{BB962C8B-B14F-4D97-AF65-F5344CB8AC3E}">
-        <p14:creationId xmlns:p14="http://schemas.microsoft.com/office/powerpoint/2010/main" val="2763206375"/>
+        <p14:creationId xmlns:p14="http://schemas.microsoft.com/office/powerpoint/2010/main" val="4192706341"/>
       </p:ext>
     </p:extLst>
   </p:cSld>
@@ -5446,6 +5428,220 @@
           <a:lstStyle/>
           <a:p>
             <a:r>
+              <a:rPr lang="en-US" dirty="0" err="1" smtClean="0"/>
+              <a:t>Javascript</a:t>
+            </a:r>
+            <a:r>
+              <a:rPr lang="en-US" dirty="0" smtClean="0"/>
+              <a:t> basics 3.0</a:t>
+            </a:r>
+            <a:endParaRPr lang="en-US" dirty="0"/>
+          </a:p>
+        </p:txBody>
+      </p:sp>
+      <p:sp>
+        <p:nvSpPr>
+          <p:cNvPr id="3" name="Content Placeholder 2"/>
+          <p:cNvSpPr>
+            <a:spLocks noGrp="1"/>
+          </p:cNvSpPr>
+          <p:nvPr>
+            <p:ph idx="1"/>
+          </p:nvPr>
+        </p:nvSpPr>
+        <p:spPr/>
+        <p:txBody>
+          <a:bodyPr/>
+          <a:lstStyle/>
+          <a:p>
+            <a:r>
+              <a:rPr lang="en-US" dirty="0"/>
+              <a:t>Show basic buttons and looping and the differences of html-triggered JS, event binding, and event listening</a:t>
+            </a:r>
+          </a:p>
+          <a:p>
+            <a:r>
+              <a:rPr lang="en-US" dirty="0"/>
+              <a:t>Show event triggers passing as parameters</a:t>
+            </a:r>
+          </a:p>
+          <a:p>
+            <a:r>
+              <a:rPr lang="en-US" dirty="0"/>
+              <a:t>Explain how </a:t>
+            </a:r>
+            <a:r>
+              <a:rPr lang="en-US" dirty="0" err="1"/>
+              <a:t>Javascript</a:t>
+            </a:r>
+            <a:r>
+              <a:rPr lang="en-US" dirty="0"/>
+              <a:t> passes some parameters explicitly (you just have to learn what these are</a:t>
+            </a:r>
+          </a:p>
+          <a:p>
+            <a:r>
+              <a:rPr lang="en-US" dirty="0"/>
+              <a:t>Show the problem with triggering events on parent </a:t>
+            </a:r>
+            <a:r>
+              <a:rPr lang="en-US" dirty="0" smtClean="0"/>
+              <a:t>elements</a:t>
+            </a:r>
+          </a:p>
+          <a:p>
+            <a:r>
+              <a:rPr lang="en-US" dirty="0" smtClean="0"/>
+              <a:t>Build a basic form with a text input and submit button</a:t>
+            </a:r>
+            <a:endParaRPr lang="en-US" dirty="0"/>
+          </a:p>
+        </p:txBody>
+      </p:sp>
+    </p:spTree>
+    <p:extLst>
+      <p:ext uri="{BB962C8B-B14F-4D97-AF65-F5344CB8AC3E}">
+        <p14:creationId xmlns:p14="http://schemas.microsoft.com/office/powerpoint/2010/main" val="2763206375"/>
+      </p:ext>
+    </p:extLst>
+  </p:cSld>
+  <p:clrMapOvr>
+    <a:masterClrMapping/>
+  </p:clrMapOvr>
+</p:sld>
+</file>
+
+<file path=ppt/slides/slide2.xml><?xml version="1.0" encoding="utf-8"?>
+<p:sld xmlns:a="http://schemas.openxmlformats.org/drawingml/2006/main" xmlns:r="http://schemas.openxmlformats.org/officeDocument/2006/relationships" xmlns:p="http://schemas.openxmlformats.org/presentationml/2006/main">
+  <p:cSld>
+    <p:spTree>
+      <p:nvGrpSpPr>
+        <p:cNvPr id="1" name=""/>
+        <p:cNvGrpSpPr/>
+        <p:nvPr/>
+      </p:nvGrpSpPr>
+      <p:grpSpPr>
+        <a:xfrm>
+          <a:off x="0" y="0"/>
+          <a:ext cx="0" cy="0"/>
+          <a:chOff x="0" y="0"/>
+          <a:chExt cx="0" cy="0"/>
+        </a:xfrm>
+      </p:grpSpPr>
+      <p:sp>
+        <p:nvSpPr>
+          <p:cNvPr id="2" name="Title 1"/>
+          <p:cNvSpPr>
+            <a:spLocks noGrp="1"/>
+          </p:cNvSpPr>
+          <p:nvPr>
+            <p:ph type="title"/>
+          </p:nvPr>
+        </p:nvSpPr>
+        <p:spPr/>
+        <p:txBody>
+          <a:bodyPr/>
+          <a:lstStyle/>
+          <a:p>
+            <a:r>
+              <a:rPr lang="en-US" dirty="0" smtClean="0"/>
+              <a:t>3 Things:</a:t>
+            </a:r>
+            <a:endParaRPr lang="en-US" dirty="0"/>
+          </a:p>
+        </p:txBody>
+      </p:sp>
+      <p:sp>
+        <p:nvSpPr>
+          <p:cNvPr id="3" name="Content Placeholder 2"/>
+          <p:cNvSpPr>
+            <a:spLocks noGrp="1"/>
+          </p:cNvSpPr>
+          <p:nvPr>
+            <p:ph idx="1"/>
+          </p:nvPr>
+        </p:nvSpPr>
+        <p:spPr/>
+        <p:txBody>
+          <a:bodyPr>
+            <a:noAutofit/>
+          </a:bodyPr>
+          <a:lstStyle/>
+          <a:p>
+            <a:r>
+              <a:rPr lang="en-US" sz="4000" dirty="0"/>
+              <a:t>The repository is here: </a:t>
+            </a:r>
+            <a:r>
+              <a:rPr lang="en-US" sz="4000" b="1" dirty="0"/>
+              <a:t>http://</a:t>
+            </a:r>
+            <a:r>
+              <a:rPr lang="en-US" sz="4000" b="1" dirty="0" smtClean="0"/>
+              <a:t>bit.ly/2mRzSc3</a:t>
+            </a:r>
+          </a:p>
+          <a:p>
+            <a:r>
+              <a:rPr lang="en-US" sz="4000" dirty="0" smtClean="0"/>
+              <a:t>W3 Schools – a great resource for HTML/CSS and a little JS</a:t>
+            </a:r>
+          </a:p>
+          <a:p>
+            <a:r>
+              <a:rPr lang="en-US" sz="4000" dirty="0" smtClean="0"/>
+              <a:t>MDN (Mozilla Developer Network) – Best ECMAScript/JavaScript reference out there</a:t>
+            </a:r>
+            <a:endParaRPr lang="en-US" sz="4000" dirty="0"/>
+          </a:p>
+        </p:txBody>
+      </p:sp>
+    </p:spTree>
+    <p:extLst>
+      <p:ext uri="{BB962C8B-B14F-4D97-AF65-F5344CB8AC3E}">
+        <p14:creationId xmlns:p14="http://schemas.microsoft.com/office/powerpoint/2010/main" val="1787766045"/>
+      </p:ext>
+    </p:extLst>
+  </p:cSld>
+  <p:clrMapOvr>
+    <a:masterClrMapping/>
+  </p:clrMapOvr>
+</p:sld>
+</file>
+
+<file path=ppt/slides/slide20.xml><?xml version="1.0" encoding="utf-8"?>
+<p:sld xmlns:a="http://schemas.openxmlformats.org/drawingml/2006/main" xmlns:r="http://schemas.openxmlformats.org/officeDocument/2006/relationships" xmlns:p="http://schemas.openxmlformats.org/presentationml/2006/main">
+  <p:cSld>
+    <p:spTree>
+      <p:nvGrpSpPr>
+        <p:cNvPr id="1" name=""/>
+        <p:cNvGrpSpPr/>
+        <p:nvPr/>
+      </p:nvGrpSpPr>
+      <p:grpSpPr>
+        <a:xfrm>
+          <a:off x="0" y="0"/>
+          <a:ext cx="0" cy="0"/>
+          <a:chOff x="0" y="0"/>
+          <a:chExt cx="0" cy="0"/>
+        </a:xfrm>
+      </p:grpSpPr>
+      <p:sp>
+        <p:nvSpPr>
+          <p:cNvPr id="2" name="Title 1"/>
+          <p:cNvSpPr>
+            <a:spLocks noGrp="1"/>
+          </p:cNvSpPr>
+          <p:nvPr>
+            <p:ph type="title"/>
+          </p:nvPr>
+        </p:nvSpPr>
+        <p:spPr/>
+        <p:txBody>
+          <a:bodyPr/>
+          <a:lstStyle/>
+          <a:p>
+            <a:r>
               <a:rPr lang="en-US" dirty="0" smtClean="0"/>
               <a:t>Challenge #3</a:t>
             </a:r>
@@ -5494,7 +5690,7 @@
 </p:sld>
 </file>
 
-<file path=ppt/slides/slide2.xml><?xml version="1.0" encoding="utf-8"?>
+<file path=ppt/slides/slide3.xml><?xml version="1.0" encoding="utf-8"?>
 <p:sld xmlns:a="http://schemas.openxmlformats.org/drawingml/2006/main" xmlns:r="http://schemas.openxmlformats.org/officeDocument/2006/relationships" xmlns:p="http://schemas.openxmlformats.org/presentationml/2006/main">
   <p:cSld>
     <p:spTree>
@@ -5572,7 +5768,7 @@
 </p:sld>
 </file>
 
-<file path=ppt/slides/slide3.xml><?xml version="1.0" encoding="utf-8"?>
+<file path=ppt/slides/slide4.xml><?xml version="1.0" encoding="utf-8"?>
 <p:sld xmlns:a="http://schemas.openxmlformats.org/drawingml/2006/main" xmlns:r="http://schemas.openxmlformats.org/officeDocument/2006/relationships" xmlns:p="http://schemas.openxmlformats.org/presentationml/2006/main">
   <p:cSld>
     <p:spTree>
@@ -5692,7 +5888,7 @@
 </p:sld>
 </file>
 
-<file path=ppt/slides/slide4.xml><?xml version="1.0" encoding="utf-8"?>
+<file path=ppt/slides/slide5.xml><?xml version="1.0" encoding="utf-8"?>
 <p:sld xmlns:a="http://schemas.openxmlformats.org/drawingml/2006/main" xmlns:r="http://schemas.openxmlformats.org/officeDocument/2006/relationships" xmlns:p="http://schemas.openxmlformats.org/presentationml/2006/main">
   <p:cSld>
     <p:spTree>
@@ -5930,7 +6126,7 @@
 </p:sld>
 </file>
 
-<file path=ppt/slides/slide5.xml><?xml version="1.0" encoding="utf-8"?>
+<file path=ppt/slides/slide6.xml><?xml version="1.0" encoding="utf-8"?>
 <p:sld xmlns:a="http://schemas.openxmlformats.org/drawingml/2006/main" xmlns:r="http://schemas.openxmlformats.org/officeDocument/2006/relationships" xmlns:p="http://schemas.openxmlformats.org/presentationml/2006/main">
   <p:cSld>
     <p:spTree>
@@ -5990,7 +6186,7 @@
 </p:sld>
 </file>
 
-<file path=ppt/slides/slide6.xml><?xml version="1.0" encoding="utf-8"?>
+<file path=ppt/slides/slide7.xml><?xml version="1.0" encoding="utf-8"?>
 <p:sld xmlns:a="http://schemas.openxmlformats.org/drawingml/2006/main" xmlns:r="http://schemas.openxmlformats.org/officeDocument/2006/relationships" xmlns:p="http://schemas.openxmlformats.org/presentationml/2006/main">
   <p:cSld>
     <p:spTree>
@@ -6050,7 +6246,7 @@
 </p:sld>
 </file>
 
-<file path=ppt/slides/slide7.xml><?xml version="1.0" encoding="utf-8"?>
+<file path=ppt/slides/slide8.xml><?xml version="1.0" encoding="utf-8"?>
 <p:sld xmlns:a="http://schemas.openxmlformats.org/drawingml/2006/main" xmlns:r="http://schemas.openxmlformats.org/officeDocument/2006/relationships" xmlns:p="http://schemas.openxmlformats.org/presentationml/2006/main">
   <p:cSld>
     <p:spTree>
@@ -6318,65 +6514,6 @@
 </p:sld>
 </file>
 
-<file path=ppt/slides/slide8.xml><?xml version="1.0" encoding="utf-8"?>
-<p:sld xmlns:a="http://schemas.openxmlformats.org/drawingml/2006/main" xmlns:r="http://schemas.openxmlformats.org/officeDocument/2006/relationships" xmlns:p="http://schemas.openxmlformats.org/presentationml/2006/main">
-  <p:cSld>
-    <p:spTree>
-      <p:nvGrpSpPr>
-        <p:cNvPr id="1" name=""/>
-        <p:cNvGrpSpPr/>
-        <p:nvPr/>
-      </p:nvGrpSpPr>
-      <p:grpSpPr>
-        <a:xfrm>
-          <a:off x="0" y="0"/>
-          <a:ext cx="0" cy="0"/>
-          <a:chOff x="0" y="0"/>
-          <a:chExt cx="0" cy="0"/>
-        </a:xfrm>
-      </p:grpSpPr>
-      <p:sp>
-        <p:nvSpPr>
-          <p:cNvPr id="2" name="Title 1"/>
-          <p:cNvSpPr>
-            <a:spLocks noGrp="1"/>
-          </p:cNvSpPr>
-          <p:nvPr>
-            <p:ph type="title"/>
-          </p:nvPr>
-        </p:nvSpPr>
-        <p:spPr>
-          <a:xfrm>
-            <a:off x="763555" y="2455182"/>
-            <a:ext cx="10515600" cy="1325563"/>
-          </a:xfrm>
-        </p:spPr>
-        <p:txBody>
-          <a:bodyPr/>
-          <a:lstStyle/>
-          <a:p>
-            <a:pPr algn="ctr"/>
-            <a:r>
-              <a:rPr lang="en-US" sz="8000" dirty="0" smtClean="0"/>
-              <a:t>Walkthrough</a:t>
-            </a:r>
-            <a:endParaRPr lang="en-US" dirty="0"/>
-          </a:p>
-        </p:txBody>
-      </p:sp>
-    </p:spTree>
-    <p:extLst>
-      <p:ext uri="{BB962C8B-B14F-4D97-AF65-F5344CB8AC3E}">
-        <p14:creationId xmlns:p14="http://schemas.microsoft.com/office/powerpoint/2010/main" val="1797200213"/>
-      </p:ext>
-    </p:extLst>
-  </p:cSld>
-  <p:clrMapOvr>
-    <a:masterClrMapping/>
-  </p:clrMapOvr>
-</p:sld>
-</file>
-
 <file path=ppt/slides/slide9.xml><?xml version="1.0" encoding="utf-8"?>
 <p:sld xmlns:a="http://schemas.openxmlformats.org/drawingml/2006/main" xmlns:r="http://schemas.openxmlformats.org/officeDocument/2006/relationships" xmlns:p="http://schemas.openxmlformats.org/presentationml/2006/main">
   <p:cSld>
@@ -6404,75 +6541,29 @@
             <p:ph type="title"/>
           </p:nvPr>
         </p:nvSpPr>
-        <p:spPr/>
-        <p:txBody>
-          <a:bodyPr/>
-          <a:lstStyle/>
-          <a:p>
-            <a:r>
-              <a:rPr lang="en-US" dirty="0" smtClean="0"/>
-              <a:t>HTML Basics</a:t>
+        <p:spPr>
+          <a:xfrm>
+            <a:off x="763555" y="2455182"/>
+            <a:ext cx="10515600" cy="1325563"/>
+          </a:xfrm>
+        </p:spPr>
+        <p:txBody>
+          <a:bodyPr/>
+          <a:lstStyle/>
+          <a:p>
+            <a:pPr algn="ctr"/>
+            <a:r>
+              <a:rPr lang="en-US" sz="8000" dirty="0" smtClean="0"/>
+              <a:t>Walkthrough</a:t>
             </a:r>
             <a:endParaRPr lang="en-US" dirty="0"/>
-          </a:p>
-        </p:txBody>
-      </p:sp>
-      <p:sp>
-        <p:nvSpPr>
-          <p:cNvPr id="3" name="Content Placeholder 2"/>
-          <p:cNvSpPr>
-            <a:spLocks noGrp="1"/>
-          </p:cNvSpPr>
-          <p:nvPr>
-            <p:ph idx="1"/>
-          </p:nvPr>
-        </p:nvSpPr>
-        <p:spPr/>
-        <p:txBody>
-          <a:bodyPr/>
-          <a:lstStyle/>
-          <a:p>
-            <a:r>
-              <a:rPr lang="en-US" dirty="0" smtClean="0"/>
-              <a:t>Using a text editor to create a file that the browser can read</a:t>
-            </a:r>
-          </a:p>
-          <a:p>
-            <a:r>
-              <a:rPr lang="en-US" dirty="0" smtClean="0"/>
-              <a:t>Inspecting the element in the browser, explaining elements</a:t>
-            </a:r>
-          </a:p>
-          <a:p>
-            <a:r>
-              <a:rPr lang="en-US" dirty="0" smtClean="0"/>
-              <a:t>Recreating the file, this time with actual markup!</a:t>
-            </a:r>
-          </a:p>
-          <a:p>
-            <a:r>
-              <a:rPr lang="en-US" dirty="0" smtClean="0"/>
-              <a:t>Inspecting the element again, showing how it is the same</a:t>
-            </a:r>
-          </a:p>
-          <a:p>
-            <a:r>
-              <a:rPr lang="en-US" dirty="0" smtClean="0"/>
-              <a:t>Explaining what HTML stands for and what its purpose is</a:t>
-            </a:r>
-          </a:p>
-          <a:p>
-            <a:r>
-              <a:rPr lang="en-US" dirty="0" smtClean="0"/>
-              <a:t>Showing what a basic HTML file could look like</a:t>
-            </a:r>
           </a:p>
         </p:txBody>
       </p:sp>
     </p:spTree>
     <p:extLst>
       <p:ext uri="{BB962C8B-B14F-4D97-AF65-F5344CB8AC3E}">
-        <p14:creationId xmlns:p14="http://schemas.microsoft.com/office/powerpoint/2010/main" val="3818386909"/>
+        <p14:creationId xmlns:p14="http://schemas.microsoft.com/office/powerpoint/2010/main" val="1797200213"/>
       </p:ext>
     </p:extLst>
   </p:cSld>

</xml_diff>

<commit_message>
added solutions, fixed challenges
</commit_message>
<xml_diff>
--- a/intro to web.pptx
+++ b/intro to web.pptx
@@ -14,18 +14,18 @@
     <p:sldId id="257" r:id="rId5"/>
     <p:sldId id="258" r:id="rId6"/>
     <p:sldId id="260" r:id="rId7"/>
-    <p:sldId id="261" r:id="rId8"/>
-    <p:sldId id="262" r:id="rId9"/>
-    <p:sldId id="269" r:id="rId10"/>
-    <p:sldId id="265" r:id="rId11"/>
-    <p:sldId id="266" r:id="rId12"/>
-    <p:sldId id="268" r:id="rId13"/>
-    <p:sldId id="273" r:id="rId14"/>
-    <p:sldId id="267" r:id="rId15"/>
-    <p:sldId id="270" r:id="rId16"/>
-    <p:sldId id="271" r:id="rId17"/>
-    <p:sldId id="274" r:id="rId18"/>
-    <p:sldId id="275" r:id="rId19"/>
+    <p:sldId id="262" r:id="rId8"/>
+    <p:sldId id="269" r:id="rId9"/>
+    <p:sldId id="265" r:id="rId10"/>
+    <p:sldId id="266" r:id="rId11"/>
+    <p:sldId id="268" r:id="rId12"/>
+    <p:sldId id="273" r:id="rId13"/>
+    <p:sldId id="267" r:id="rId14"/>
+    <p:sldId id="270" r:id="rId15"/>
+    <p:sldId id="271" r:id="rId16"/>
+    <p:sldId id="274" r:id="rId17"/>
+    <p:sldId id="275" r:id="rId18"/>
+    <p:sldId id="278" r:id="rId19"/>
     <p:sldId id="272" r:id="rId20"/>
     <p:sldId id="276" r:id="rId21"/>
   </p:sldIdLst>
@@ -216,7 +216,7 @@
           <a:p>
             <a:fld id="{7C28A56C-B7DC-4B0B-A28E-64830014DEAF}" type="datetimeFigureOut">
               <a:rPr lang="en-US" smtClean="0"/>
-              <a:t>1/19/2018</a:t>
+              <a:t>2/7/2018</a:t>
             </a:fld>
             <a:endParaRPr lang="en-US"/>
           </a:p>
@@ -967,37 +967,29 @@
           <a:p>
             <a:r>
               <a:rPr lang="en-US" dirty="0" smtClean="0"/>
-              <a:t>A brief bit of history here:</a:t>
-            </a:r>
-          </a:p>
-          <a:p>
-            <a:r>
-              <a:rPr lang="en-US" dirty="0" smtClean="0"/>
-              <a:t>Mosaic was the first browser</a:t>
+              <a:t>Browsers interpret HTML, CSS, and JavaScript</a:t>
+            </a:r>
+          </a:p>
+          <a:p>
+            <a:r>
+              <a:rPr lang="en-US" dirty="0" smtClean="0"/>
+              <a:t>Browsers simply</a:t>
             </a:r>
             <a:r>
               <a:rPr lang="en-US" baseline="0" dirty="0" smtClean="0"/>
-              <a:t> to believe in the possibility of a uniform web experience between mac and windows users.</a:t>
-            </a:r>
-          </a:p>
-          <a:p>
+              <a:t> read the markup and display whatever the HTML and CSS says to</a:t>
+            </a:r>
+            <a:endParaRPr lang="en-US" dirty="0" smtClean="0"/>
+          </a:p>
+          <a:p>
+            <a:r>
+              <a:rPr lang="en-US" dirty="0" smtClean="0"/>
+              <a:t>Despite this, uniformity</a:t>
+            </a:r>
             <a:r>
               <a:rPr lang="en-US" baseline="0" dirty="0" smtClean="0"/>
-              <a:t>Mosaic also implemented HTML 2.0</a:t>
-            </a:r>
-          </a:p>
-          <a:p>
-            <a:r>
-              <a:rPr lang="en-US" baseline="0" dirty="0" smtClean="0"/>
-              <a:t>HTML’s initial kinks and awkwardness were beginning to iron out, and the web was ready to reach a broader audience</a:t>
-            </a:r>
-          </a:p>
-          <a:p>
-            <a:r>
-              <a:rPr lang="en-US" baseline="0" dirty="0" smtClean="0"/>
-              <a:t>Of course, Mosaic evolved into Netscape Navigator, and long story short: a multitude of web browsers were born</a:t>
-            </a:r>
-            <a:endParaRPr lang="en-US" dirty="0"/>
+              <a:t> across browsers is still to this day a problem (although thankfully at least Explorer is now dying)</a:t>
+            </a:r>
           </a:p>
         </p:txBody>
       </p:sp>
@@ -1027,7 +1019,7 @@
     </p:spTree>
     <p:extLst>
       <p:ext uri="{BB962C8B-B14F-4D97-AF65-F5344CB8AC3E}">
-        <p14:creationId xmlns:p14="http://schemas.microsoft.com/office/powerpoint/2010/main" val="2831644222"/>
+        <p14:creationId xmlns:p14="http://schemas.microsoft.com/office/powerpoint/2010/main" val="3547073364"/>
       </p:ext>
     </p:extLst>
   </p:cSld>
@@ -1083,29 +1075,27 @@
           <a:p>
             <a:r>
               <a:rPr lang="en-US" dirty="0" smtClean="0"/>
-              <a:t>Browsers interpret HTML, CSS, and JavaScript</a:t>
-            </a:r>
-          </a:p>
-          <a:p>
-            <a:r>
-              <a:rPr lang="en-US" dirty="0" smtClean="0"/>
-              <a:t>Browsers simply</a:t>
+              <a:t>[Set</a:t>
             </a:r>
             <a:r>
               <a:rPr lang="en-US" baseline="0" dirty="0" smtClean="0"/>
-              <a:t> read the markup and display whatever the HTML and CSS says to</a:t>
+              <a:t> up dual screen: development environment is shown and these bullet points are meant to be read by the presenter on their own screen]</a:t>
             </a:r>
             <a:endParaRPr lang="en-US" dirty="0" smtClean="0"/>
           </a:p>
           <a:p>
             <a:r>
               <a:rPr lang="en-US" dirty="0" smtClean="0"/>
-              <a:t>Despite this, uniformity</a:t>
+              <a:t>Now that I’ve talked a lot, I’ll show you how you can create a web page so</a:t>
             </a:r>
             <a:r>
               <a:rPr lang="en-US" baseline="0" dirty="0" smtClean="0"/>
-              <a:t> across browsers is still to this day a problem (although thankfully at least Explorer is now dying)</a:t>
-            </a:r>
+              <a:t> that you can see the components involved in their most basic form.</a:t>
+            </a:r>
+            <a:endParaRPr lang="en-US" dirty="0" smtClean="0"/>
+          </a:p>
+          <a:p>
+            <a:endParaRPr lang="en-US" dirty="0"/>
           </a:p>
         </p:txBody>
       </p:sp>
@@ -1135,7 +1125,7 @@
     </p:spTree>
     <p:extLst>
       <p:ext uri="{BB962C8B-B14F-4D97-AF65-F5344CB8AC3E}">
-        <p14:creationId xmlns:p14="http://schemas.microsoft.com/office/powerpoint/2010/main" val="3547073364"/>
+        <p14:creationId xmlns:p14="http://schemas.microsoft.com/office/powerpoint/2010/main" val="469731727"/>
       </p:ext>
     </p:extLst>
   </p:cSld>
@@ -1189,28 +1179,6 @@
           <a:bodyPr/>
           <a:lstStyle/>
           <a:p>
-            <a:r>
-              <a:rPr lang="en-US" dirty="0" smtClean="0"/>
-              <a:t>[Set</a:t>
-            </a:r>
-            <a:r>
-              <a:rPr lang="en-US" baseline="0" dirty="0" smtClean="0"/>
-              <a:t> up dual screen: development environment is shown and these bullet points are meant to be read by the presenter on their own screen]</a:t>
-            </a:r>
-            <a:endParaRPr lang="en-US" dirty="0" smtClean="0"/>
-          </a:p>
-          <a:p>
-            <a:r>
-              <a:rPr lang="en-US" dirty="0" smtClean="0"/>
-              <a:t>Now that I’ve talked a lot, I’ll show you how you can create a web page so</a:t>
-            </a:r>
-            <a:r>
-              <a:rPr lang="en-US" baseline="0" dirty="0" smtClean="0"/>
-              <a:t> that you can see the components involved in their most basic form.</a:t>
-            </a:r>
-            <a:endParaRPr lang="en-US" dirty="0" smtClean="0"/>
-          </a:p>
-          <a:p>
             <a:endParaRPr lang="en-US" dirty="0"/>
           </a:p>
         </p:txBody>
@@ -1241,7 +1209,7 @@
     </p:spTree>
     <p:extLst>
       <p:ext uri="{BB962C8B-B14F-4D97-AF65-F5344CB8AC3E}">
-        <p14:creationId xmlns:p14="http://schemas.microsoft.com/office/powerpoint/2010/main" val="469731727"/>
+        <p14:creationId xmlns:p14="http://schemas.microsoft.com/office/powerpoint/2010/main" val="4126095958"/>
       </p:ext>
     </p:extLst>
   </p:cSld>
@@ -1295,6 +1263,10 @@
           <a:bodyPr/>
           <a:lstStyle/>
           <a:p>
+            <a:r>
+              <a:rPr lang="en-US" dirty="0" smtClean="0"/>
+              <a:t>Ideally, 15 minutes for this</a:t>
+            </a:r>
             <a:endParaRPr lang="en-US" dirty="0"/>
           </a:p>
         </p:txBody>
@@ -1316,7 +1288,7 @@
           <a:p>
             <a:fld id="{AE889E9D-53EF-4B68-80FA-0082D8AB9020}" type="slidenum">
               <a:rPr lang="en-US" smtClean="0"/>
-              <a:t>10</a:t>
+              <a:t>12</a:t>
             </a:fld>
             <a:endParaRPr lang="en-US"/>
           </a:p>
@@ -1325,7 +1297,99 @@
     </p:spTree>
     <p:extLst>
       <p:ext uri="{BB962C8B-B14F-4D97-AF65-F5344CB8AC3E}">
-        <p14:creationId xmlns:p14="http://schemas.microsoft.com/office/powerpoint/2010/main" val="4126095958"/>
+        <p14:creationId xmlns:p14="http://schemas.microsoft.com/office/powerpoint/2010/main" val="1948181591"/>
+      </p:ext>
+    </p:extLst>
+  </p:cSld>
+  <p:clrMapOvr>
+    <a:masterClrMapping/>
+  </p:clrMapOvr>
+</p:notes>
+</file>
+
+<file path=ppt/notesSlides/notesSlide9.xml><?xml version="1.0" encoding="utf-8"?>
+<p:notes xmlns:a="http://schemas.openxmlformats.org/drawingml/2006/main" xmlns:r="http://schemas.openxmlformats.org/officeDocument/2006/relationships" xmlns:p="http://schemas.openxmlformats.org/presentationml/2006/main">
+  <p:cSld>
+    <p:spTree>
+      <p:nvGrpSpPr>
+        <p:cNvPr id="1" name=""/>
+        <p:cNvGrpSpPr/>
+        <p:nvPr/>
+      </p:nvGrpSpPr>
+      <p:grpSpPr>
+        <a:xfrm>
+          <a:off x="0" y="0"/>
+          <a:ext cx="0" cy="0"/>
+          <a:chOff x="0" y="0"/>
+          <a:chExt cx="0" cy="0"/>
+        </a:xfrm>
+      </p:grpSpPr>
+      <p:sp>
+        <p:nvSpPr>
+          <p:cNvPr id="2" name="Slide Image Placeholder 1"/>
+          <p:cNvSpPr>
+            <a:spLocks noGrp="1" noRot="1" noChangeAspect="1"/>
+          </p:cNvSpPr>
+          <p:nvPr>
+            <p:ph type="sldImg"/>
+          </p:nvPr>
+        </p:nvSpPr>
+        <p:spPr/>
+      </p:sp>
+      <p:sp>
+        <p:nvSpPr>
+          <p:cNvPr id="3" name="Notes Placeholder 2"/>
+          <p:cNvSpPr>
+            <a:spLocks noGrp="1"/>
+          </p:cNvSpPr>
+          <p:nvPr>
+            <p:ph type="body" idx="1"/>
+          </p:nvPr>
+        </p:nvSpPr>
+        <p:spPr/>
+        <p:txBody>
+          <a:bodyPr/>
+          <a:lstStyle/>
+          <a:p>
+            <a:r>
+              <a:rPr lang="en-US" dirty="0" smtClean="0"/>
+              <a:t>This should take</a:t>
+            </a:r>
+            <a:r>
+              <a:rPr lang="en-US" baseline="0" dirty="0" smtClean="0"/>
+              <a:t> 5 minutes</a:t>
+            </a:r>
+            <a:endParaRPr lang="en-US" dirty="0"/>
+          </a:p>
+        </p:txBody>
+      </p:sp>
+      <p:sp>
+        <p:nvSpPr>
+          <p:cNvPr id="4" name="Slide Number Placeholder 3"/>
+          <p:cNvSpPr>
+            <a:spLocks noGrp="1"/>
+          </p:cNvSpPr>
+          <p:nvPr>
+            <p:ph type="sldNum" sz="quarter" idx="10"/>
+          </p:nvPr>
+        </p:nvSpPr>
+        <p:spPr/>
+        <p:txBody>
+          <a:bodyPr/>
+          <a:lstStyle/>
+          <a:p>
+            <a:fld id="{AE889E9D-53EF-4B68-80FA-0082D8AB9020}" type="slidenum">
+              <a:rPr lang="en-US" smtClean="0"/>
+              <a:t>17</a:t>
+            </a:fld>
+            <a:endParaRPr lang="en-US"/>
+          </a:p>
+        </p:txBody>
+      </p:sp>
+    </p:spTree>
+    <p:extLst>
+      <p:ext uri="{BB962C8B-B14F-4D97-AF65-F5344CB8AC3E}">
+        <p14:creationId xmlns:p14="http://schemas.microsoft.com/office/powerpoint/2010/main" val="2022080831"/>
       </p:ext>
     </p:extLst>
   </p:cSld>
@@ -1474,7 +1538,7 @@
           <a:p>
             <a:fld id="{B417B79C-9BEE-4788-8A40-105E29A8A87D}" type="datetimeFigureOut">
               <a:rPr lang="en-US" smtClean="0"/>
-              <a:t>1/19/2018</a:t>
+              <a:t>2/7/2018</a:t>
             </a:fld>
             <a:endParaRPr lang="en-US"/>
           </a:p>
@@ -1652,7 +1716,7 @@
           <a:p>
             <a:fld id="{B417B79C-9BEE-4788-8A40-105E29A8A87D}" type="datetimeFigureOut">
               <a:rPr lang="en-US" smtClean="0"/>
-              <a:t>1/19/2018</a:t>
+              <a:t>2/7/2018</a:t>
             </a:fld>
             <a:endParaRPr lang="en-US"/>
           </a:p>
@@ -1840,7 +1904,7 @@
           <a:p>
             <a:fld id="{B417B79C-9BEE-4788-8A40-105E29A8A87D}" type="datetimeFigureOut">
               <a:rPr lang="en-US" smtClean="0"/>
-              <a:t>1/19/2018</a:t>
+              <a:t>2/7/2018</a:t>
             </a:fld>
             <a:endParaRPr lang="en-US"/>
           </a:p>
@@ -2018,7 +2082,7 @@
           <a:p>
             <a:fld id="{B417B79C-9BEE-4788-8A40-105E29A8A87D}" type="datetimeFigureOut">
               <a:rPr lang="en-US" smtClean="0"/>
-              <a:t>1/19/2018</a:t>
+              <a:t>2/7/2018</a:t>
             </a:fld>
             <a:endParaRPr lang="en-US"/>
           </a:p>
@@ -2272,7 +2336,7 @@
           <a:p>
             <a:fld id="{B417B79C-9BEE-4788-8A40-105E29A8A87D}" type="datetimeFigureOut">
               <a:rPr lang="en-US" smtClean="0"/>
-              <a:t>1/19/2018</a:t>
+              <a:t>2/7/2018</a:t>
             </a:fld>
             <a:endParaRPr lang="en-US"/>
           </a:p>
@@ -2512,7 +2576,7 @@
           <a:p>
             <a:fld id="{B417B79C-9BEE-4788-8A40-105E29A8A87D}" type="datetimeFigureOut">
               <a:rPr lang="en-US" smtClean="0"/>
-              <a:t>1/19/2018</a:t>
+              <a:t>2/7/2018</a:t>
             </a:fld>
             <a:endParaRPr lang="en-US"/>
           </a:p>
@@ -2887,7 +2951,7 @@
           <a:p>
             <a:fld id="{B417B79C-9BEE-4788-8A40-105E29A8A87D}" type="datetimeFigureOut">
               <a:rPr lang="en-US" smtClean="0"/>
-              <a:t>1/19/2018</a:t>
+              <a:t>2/7/2018</a:t>
             </a:fld>
             <a:endParaRPr lang="en-US"/>
           </a:p>
@@ -3013,7 +3077,7 @@
           <a:p>
             <a:fld id="{B417B79C-9BEE-4788-8A40-105E29A8A87D}" type="datetimeFigureOut">
               <a:rPr lang="en-US" smtClean="0"/>
-              <a:t>1/19/2018</a:t>
+              <a:t>2/7/2018</a:t>
             </a:fld>
             <a:endParaRPr lang="en-US"/>
           </a:p>
@@ -3116,7 +3180,7 @@
           <a:p>
             <a:fld id="{B417B79C-9BEE-4788-8A40-105E29A8A87D}" type="datetimeFigureOut">
               <a:rPr lang="en-US" smtClean="0"/>
-              <a:t>1/19/2018</a:t>
+              <a:t>2/7/2018</a:t>
             </a:fld>
             <a:endParaRPr lang="en-US"/>
           </a:p>
@@ -3401,7 +3465,7 @@
           <a:p>
             <a:fld id="{B417B79C-9BEE-4788-8A40-105E29A8A87D}" type="datetimeFigureOut">
               <a:rPr lang="en-US" smtClean="0"/>
-              <a:t>1/19/2018</a:t>
+              <a:t>2/7/2018</a:t>
             </a:fld>
             <a:endParaRPr lang="en-US"/>
           </a:p>
@@ -3666,7 +3730,7 @@
           <a:p>
             <a:fld id="{B417B79C-9BEE-4788-8A40-105E29A8A87D}" type="datetimeFigureOut">
               <a:rPr lang="en-US" smtClean="0"/>
-              <a:t>1/19/2018</a:t>
+              <a:t>2/7/2018</a:t>
             </a:fld>
             <a:endParaRPr lang="en-US"/>
           </a:p>
@@ -3882,7 +3946,7 @@
           <a:p>
             <a:fld id="{B417B79C-9BEE-4788-8A40-105E29A8A87D}" type="datetimeFigureOut">
               <a:rPr lang="en-US" smtClean="0"/>
-              <a:t>1/19/2018</a:t>
+              <a:t>2/7/2018</a:t>
             </a:fld>
             <a:endParaRPr lang="en-US"/>
           </a:p>
@@ -4393,7 +4457,7 @@
           <a:p>
             <a:r>
               <a:rPr lang="en-US" dirty="0" smtClean="0"/>
-              <a:t>HTML Basics</a:t>
+              <a:t>CSS Basics</a:t>
             </a:r>
             <a:endParaRPr lang="en-US" dirty="0"/>
           </a:p>
@@ -4415,46 +4479,75 @@
           <a:lstStyle/>
           <a:p>
             <a:r>
-              <a:rPr lang="en-US" dirty="0" smtClean="0"/>
-              <a:t>Using a text editor to create a file that the browser can read</a:t>
-            </a:r>
-          </a:p>
-          <a:p>
-            <a:r>
-              <a:rPr lang="en-US" dirty="0" smtClean="0"/>
-              <a:t>Inspecting the element in the browser, explaining elements</a:t>
-            </a:r>
-          </a:p>
-          <a:p>
-            <a:r>
-              <a:rPr lang="en-US" dirty="0" smtClean="0"/>
-              <a:t>Recreating the file, this time with actual markup!</a:t>
-            </a:r>
-          </a:p>
-          <a:p>
-            <a:r>
-              <a:rPr lang="en-US" dirty="0" smtClean="0"/>
-              <a:t>Inspecting the element again, showing how it is the same</a:t>
-            </a:r>
-          </a:p>
-          <a:p>
-            <a:r>
-              <a:rPr lang="en-US" dirty="0" smtClean="0"/>
-              <a:t>Explaining what HTML stands for and what its purpose is</a:t>
-            </a:r>
-          </a:p>
-          <a:p>
-            <a:r>
-              <a:rPr lang="en-US" dirty="0" smtClean="0"/>
-              <a:t>Showing what a basic HTML file could look like</a:t>
-            </a:r>
+              <a:rPr lang="en-US" dirty="0"/>
+              <a:t>Manipulating the style of an element </a:t>
+            </a:r>
+            <a:r>
+              <a:rPr lang="en-US" dirty="0" smtClean="0"/>
+              <a:t>directly</a:t>
+            </a:r>
+          </a:p>
+          <a:p>
+            <a:r>
+              <a:rPr lang="en-US" dirty="0" smtClean="0"/>
+              <a:t>Discussing why styling is best when applied broadly</a:t>
+            </a:r>
+            <a:endParaRPr lang="en-US" dirty="0"/>
+          </a:p>
+          <a:p>
+            <a:r>
+              <a:rPr lang="en-US" dirty="0"/>
+              <a:t>Manipulating the style of an element with in-html </a:t>
+            </a:r>
+            <a:r>
+              <a:rPr lang="en-US" dirty="0" err="1"/>
+              <a:t>css</a:t>
+            </a:r>
+            <a:endParaRPr lang="en-US" dirty="0"/>
+          </a:p>
+          <a:p>
+            <a:r>
+              <a:rPr lang="en-US" dirty="0"/>
+              <a:t>Manipulating the style of an element with a </a:t>
+            </a:r>
+            <a:r>
+              <a:rPr lang="en-US" dirty="0" err="1"/>
+              <a:t>css</a:t>
+            </a:r>
+            <a:r>
+              <a:rPr lang="en-US" dirty="0"/>
+              <a:t> </a:t>
+            </a:r>
+            <a:r>
+              <a:rPr lang="en-US" dirty="0" smtClean="0"/>
+              <a:t>file</a:t>
+            </a:r>
+          </a:p>
+          <a:p>
+            <a:r>
+              <a:rPr lang="en-US" dirty="0" smtClean="0"/>
+              <a:t>Discussion about why all of these options exist</a:t>
+            </a:r>
+          </a:p>
+          <a:p>
+            <a:r>
+              <a:rPr lang="en-US" dirty="0" smtClean="0"/>
+              <a:t>Showing a hover element</a:t>
+            </a:r>
+          </a:p>
+          <a:p>
+            <a:r>
+              <a:rPr lang="en-US" dirty="0" smtClean="0"/>
+              <a:t>Explaining what CSS stands for and what its purpose is</a:t>
+            </a:r>
+            <a:endParaRPr lang="en-US" dirty="0"/>
           </a:p>
         </p:txBody>
       </p:sp>
     </p:spTree>
     <p:extLst>
       <p:ext uri="{BB962C8B-B14F-4D97-AF65-F5344CB8AC3E}">
-        <p14:creationId xmlns:p14="http://schemas.microsoft.com/office/powerpoint/2010/main" val="3818386909"/>
+        <p14:creationId xmlns:p14="http://schemas.microsoft.com/office/powerpoint/2010/main" val="2723469417"/>
       </p:ext>
     </p:extLst>
   </p:cSld>
@@ -4498,7 +4591,7 @@
           <a:p>
             <a:r>
               <a:rPr lang="en-US" dirty="0" smtClean="0"/>
-              <a:t>CSS Basics</a:t>
+              <a:t>CSS Basics 2.0</a:t>
             </a:r>
             <a:endParaRPr lang="en-US" dirty="0"/>
           </a:p>
@@ -4520,66 +4613,41 @@
           <a:lstStyle/>
           <a:p>
             <a:r>
-              <a:rPr lang="en-US" dirty="0"/>
-              <a:t>Manipulating the style of an element </a:t>
-            </a:r>
-            <a:r>
-              <a:rPr lang="en-US" dirty="0" smtClean="0"/>
-              <a:t>directly</a:t>
-            </a:r>
-          </a:p>
-          <a:p>
-            <a:r>
-              <a:rPr lang="en-US" dirty="0" smtClean="0"/>
-              <a:t>Discussing why styling is best when applied broadly</a:t>
-            </a:r>
-            <a:endParaRPr lang="en-US" dirty="0"/>
-          </a:p>
-          <a:p>
-            <a:r>
-              <a:rPr lang="en-US" dirty="0"/>
-              <a:t>Manipulating the style of an element with in-html </a:t>
-            </a:r>
-            <a:r>
-              <a:rPr lang="en-US" dirty="0" err="1"/>
+              <a:rPr lang="en-US" dirty="0" smtClean="0"/>
+              <a:t>All in one file: explain each element, one at a time</a:t>
+            </a:r>
+          </a:p>
+          <a:p>
+            <a:r>
+              <a:rPr lang="en-US" dirty="0" smtClean="0"/>
+              <a:t>Showing how the cascading works: parent is styled one way and the child is also styled</a:t>
+            </a:r>
+          </a:p>
+          <a:p>
+            <a:r>
+              <a:rPr lang="en-US" dirty="0" smtClean="0"/>
+              <a:t>Showing how child with different styling will not inherit</a:t>
+            </a:r>
+          </a:p>
+          <a:p>
+            <a:r>
+              <a:rPr lang="en-US" dirty="0" smtClean="0"/>
+              <a:t>Showing how an in-line styling overrides the </a:t>
+            </a:r>
+            <a:r>
+              <a:rPr lang="en-US" dirty="0" err="1" smtClean="0"/>
               <a:t>css</a:t>
             </a:r>
-            <a:endParaRPr lang="en-US" dirty="0"/>
-          </a:p>
-          <a:p>
-            <a:r>
-              <a:rPr lang="en-US" dirty="0"/>
-              <a:t>Manipulating the style of an element with a </a:t>
-            </a:r>
-            <a:r>
-              <a:rPr lang="en-US" dirty="0" err="1"/>
+            <a:endParaRPr lang="en-US" dirty="0" smtClean="0"/>
+          </a:p>
+          <a:p>
+            <a:r>
+              <a:rPr lang="en-US" dirty="0" smtClean="0"/>
+              <a:t>Showing how an ID element overrides the </a:t>
+            </a:r>
+            <a:r>
+              <a:rPr lang="en-US" dirty="0" err="1" smtClean="0"/>
               <a:t>css</a:t>
-            </a:r>
-            <a:r>
-              <a:rPr lang="en-US" dirty="0"/>
-              <a:t> </a:t>
-            </a:r>
-            <a:r>
-              <a:rPr lang="en-US" dirty="0" smtClean="0"/>
-              <a:t>file</a:t>
-            </a:r>
-          </a:p>
-          <a:p>
-            <a:r>
-              <a:rPr lang="en-US" dirty="0" smtClean="0"/>
-              <a:t>Discussion about why all of these options exist</a:t>
-            </a:r>
-          </a:p>
-          <a:p>
-            <a:r>
-              <a:rPr lang="en-US" dirty="0" smtClean="0"/>
-              <a:t>Showing a hover element</a:t>
-            </a:r>
-          </a:p>
-          <a:p>
-            <a:r>
-              <a:rPr lang="en-US" dirty="0" smtClean="0"/>
-              <a:t>Explaining what CSS stands for and what its purpose is</a:t>
             </a:r>
             <a:endParaRPr lang="en-US" dirty="0"/>
           </a:p>
@@ -4588,7 +4656,7 @@
     </p:spTree>
     <p:extLst>
       <p:ext uri="{BB962C8B-B14F-4D97-AF65-F5344CB8AC3E}">
-        <p14:creationId xmlns:p14="http://schemas.microsoft.com/office/powerpoint/2010/main" val="2723469417"/>
+        <p14:creationId xmlns:p14="http://schemas.microsoft.com/office/powerpoint/2010/main" val="460696276"/>
       </p:ext>
     </p:extLst>
   </p:cSld>
@@ -4632,7 +4700,7 @@
           <a:p>
             <a:r>
               <a:rPr lang="en-US" dirty="0" smtClean="0"/>
-              <a:t>CSS Basics 2.0</a:t>
+              <a:t>Challenge #1</a:t>
             </a:r>
             <a:endParaRPr lang="en-US" dirty="0"/>
           </a:p>
@@ -4648,48 +4716,127 @@
             <p:ph idx="1"/>
           </p:nvPr>
         </p:nvSpPr>
-        <p:spPr/>
-        <p:txBody>
-          <a:bodyPr/>
-          <a:lstStyle/>
-          <a:p>
-            <a:r>
-              <a:rPr lang="en-US" dirty="0" smtClean="0"/>
-              <a:t>All in one file: explain each element, one at a time</a:t>
-            </a:r>
-          </a:p>
-          <a:p>
-            <a:r>
-              <a:rPr lang="en-US" dirty="0" smtClean="0"/>
-              <a:t>Showing how the cascading works: parent is styled one way and the child is also styled</a:t>
-            </a:r>
-          </a:p>
-          <a:p>
-            <a:r>
-              <a:rPr lang="en-US" dirty="0" smtClean="0"/>
-              <a:t>Showing how child with different styling will not inherit</a:t>
-            </a:r>
-          </a:p>
-          <a:p>
-            <a:r>
-              <a:rPr lang="en-US" dirty="0" smtClean="0"/>
-              <a:t>Showing how an in-line styling overrides the </a:t>
-            </a:r>
-            <a:r>
-              <a:rPr lang="en-US" dirty="0" err="1" smtClean="0"/>
-              <a:t>css</a:t>
+        <p:spPr>
+          <a:xfrm>
+            <a:off x="508000" y="1825625"/>
+            <a:ext cx="11074400" cy="4863042"/>
+          </a:xfrm>
+        </p:spPr>
+        <p:txBody>
+          <a:bodyPr/>
+          <a:lstStyle/>
+          <a:p>
+            <a:r>
+              <a:rPr lang="en-US" dirty="0" smtClean="0"/>
+              <a:t>Build a 250x250 pixel element with a 150x150 pixel element inside</a:t>
+            </a:r>
+          </a:p>
+          <a:p>
+            <a:pPr lvl="1"/>
+            <a:r>
+              <a:rPr lang="en-US" dirty="0" smtClean="0"/>
+              <a:t>Tip: Try using a “div” element &lt;div&gt;, give them borders so we can see</a:t>
+            </a:r>
+          </a:p>
+          <a:p>
+            <a:r>
+              <a:rPr lang="en-US" dirty="0" smtClean="0"/>
+              <a:t>Style these using a CSS document, </a:t>
+            </a:r>
+            <a:r>
+              <a:rPr lang="en-US" dirty="0" smtClean="0"/>
+              <a:t>not inline or &lt;style&gt; </a:t>
+            </a:r>
+            <a:r>
+              <a:rPr lang="en-US" dirty="0" smtClean="0"/>
+              <a:t>HTML</a:t>
+            </a:r>
+          </a:p>
+          <a:p>
+            <a:pPr lvl="1"/>
+            <a:r>
+              <a:rPr lang="en-US" dirty="0" smtClean="0"/>
+              <a:t>Use classes, not IDs to accomplish this</a:t>
+            </a:r>
+          </a:p>
+          <a:p>
+            <a:r>
+              <a:rPr lang="en-US" dirty="0" smtClean="0"/>
+              <a:t>Make the 250 pixel element change color on hover and the 150 pixel element change grow larger on hover</a:t>
+            </a:r>
+          </a:p>
+          <a:p>
+            <a:r>
+              <a:rPr lang="en-US" dirty="0" smtClean="0"/>
+              <a:t>Bonus:</a:t>
+            </a:r>
+          </a:p>
+          <a:p>
+            <a:pPr lvl="1"/>
+            <a:r>
+              <a:rPr lang="en-US" dirty="0" smtClean="0"/>
+              <a:t>Make the </a:t>
+            </a:r>
+            <a:r>
+              <a:rPr lang="en-US" dirty="0" smtClean="0"/>
+              <a:t>first element’s </a:t>
+            </a:r>
+            <a:r>
+              <a:rPr lang="en-US" i="1" dirty="0" smtClean="0"/>
+              <a:t>maximum</a:t>
+            </a:r>
+            <a:r>
+              <a:rPr lang="en-US" dirty="0" smtClean="0"/>
+              <a:t> </a:t>
+            </a:r>
+            <a:r>
+              <a:rPr lang="en-US" dirty="0" smtClean="0"/>
+              <a:t>size</a:t>
+            </a:r>
+            <a:r>
+              <a:rPr lang="en-US" dirty="0" smtClean="0"/>
+              <a:t> 500 and </a:t>
+            </a:r>
+            <a:r>
+              <a:rPr lang="en-US" i="1" dirty="0" smtClean="0"/>
+              <a:t>minimum </a:t>
+            </a:r>
+            <a:r>
+              <a:rPr lang="en-US" dirty="0" smtClean="0"/>
+              <a:t>250 </a:t>
+            </a:r>
+            <a:r>
+              <a:rPr lang="en-US" i="1" dirty="0" smtClean="0"/>
+              <a:t>-</a:t>
+            </a:r>
+            <a:r>
+              <a:rPr lang="en-US" dirty="0" smtClean="0"/>
+              <a:t> </a:t>
+            </a:r>
+            <a:r>
+              <a:rPr lang="en-US" dirty="0" smtClean="0"/>
+              <a:t>it will shrink in size if the browser shrinks in size (this is called responsive design)</a:t>
+            </a:r>
+          </a:p>
+          <a:p>
+            <a:pPr lvl="1"/>
+            <a:r>
+              <a:rPr lang="en-US" dirty="0" smtClean="0"/>
+              <a:t>Make the inner element’s size a % of the outer </a:t>
+            </a:r>
+            <a:r>
+              <a:rPr lang="en-US" dirty="0" smtClean="0"/>
+              <a:t>element</a:t>
+            </a:r>
+          </a:p>
+          <a:p>
+            <a:r>
+              <a:rPr lang="en-US" dirty="0" smtClean="0"/>
+              <a:t>Solution is included in folder “answers”</a:t>
             </a:r>
             <a:endParaRPr lang="en-US" dirty="0" smtClean="0"/>
           </a:p>
           <a:p>
-            <a:r>
-              <a:rPr lang="en-US" dirty="0" smtClean="0"/>
-              <a:t>Showing how an ID element overrides the </a:t>
-            </a:r>
-            <a:r>
-              <a:rPr lang="en-US" dirty="0" err="1" smtClean="0"/>
-              <a:t>css</a:t>
-            </a:r>
             <a:endParaRPr lang="en-US" dirty="0"/>
           </a:p>
         </p:txBody>
@@ -4697,7 +4844,7 @@
     </p:spTree>
     <p:extLst>
       <p:ext uri="{BB962C8B-B14F-4D97-AF65-F5344CB8AC3E}">
-        <p14:creationId xmlns:p14="http://schemas.microsoft.com/office/powerpoint/2010/main" val="460696276"/>
+        <p14:creationId xmlns:p14="http://schemas.microsoft.com/office/powerpoint/2010/main" val="1946294190"/>
       </p:ext>
     </p:extLst>
   </p:cSld>
@@ -4741,7 +4888,7 @@
           <a:p>
             <a:r>
               <a:rPr lang="en-US" dirty="0" smtClean="0"/>
-              <a:t>Challenge #1</a:t>
+              <a:t>Scraping Basics</a:t>
             </a:r>
             <a:endParaRPr lang="en-US" dirty="0"/>
           </a:p>
@@ -4757,76 +4904,43 @@
             <p:ph idx="1"/>
           </p:nvPr>
         </p:nvSpPr>
-        <p:spPr>
-          <a:xfrm>
-            <a:off x="508000" y="1825625"/>
-            <a:ext cx="11074400" cy="4863042"/>
-          </a:xfrm>
-        </p:spPr>
-        <p:txBody>
-          <a:bodyPr/>
-          <a:lstStyle/>
-          <a:p>
-            <a:r>
-              <a:rPr lang="en-US" dirty="0" smtClean="0"/>
-              <a:t>Build a 250x250 pixel element with a 150x150 pixel element inside</a:t>
-            </a:r>
-          </a:p>
-          <a:p>
-            <a:pPr lvl="1"/>
-            <a:r>
-              <a:rPr lang="en-US" dirty="0" smtClean="0"/>
-              <a:t>Tip: Try using a “div” element &lt;div&gt;, give them borders so we can see</a:t>
-            </a:r>
-          </a:p>
-          <a:p>
-            <a:r>
-              <a:rPr lang="en-US" dirty="0" smtClean="0"/>
-              <a:t>Style these using a CSS document, not inline HTML</a:t>
-            </a:r>
-          </a:p>
-          <a:p>
-            <a:pPr lvl="1"/>
-            <a:r>
-              <a:rPr lang="en-US" dirty="0" smtClean="0"/>
-              <a:t>Use classes, not IDs to accomplish this</a:t>
-            </a:r>
-          </a:p>
-          <a:p>
-            <a:r>
-              <a:rPr lang="en-US" dirty="0" smtClean="0"/>
-              <a:t>Make the 250 pixel element change color on hover and the 150 pixel element change grow larger on hover</a:t>
-            </a:r>
-          </a:p>
-          <a:p>
-            <a:r>
-              <a:rPr lang="en-US" dirty="0" smtClean="0"/>
-              <a:t>Bonus:</a:t>
-            </a:r>
-          </a:p>
-          <a:p>
-            <a:pPr lvl="1"/>
-            <a:r>
-              <a:rPr lang="en-US" dirty="0" smtClean="0"/>
-              <a:t>Make the element’s </a:t>
-            </a:r>
-            <a:r>
-              <a:rPr lang="en-US" i="1" dirty="0" smtClean="0"/>
-              <a:t>maximum</a:t>
-            </a:r>
-            <a:r>
-              <a:rPr lang="en-US" dirty="0" smtClean="0"/>
-              <a:t> size 250, but it will shrink in size if the browser shrinks in size (this is called responsive design)</a:t>
-            </a:r>
-          </a:p>
-          <a:p>
-            <a:pPr lvl="1"/>
-            <a:r>
-              <a:rPr lang="en-US" dirty="0" smtClean="0"/>
-              <a:t>Make the inner element’s size a % of the outer element</a:t>
-            </a:r>
-          </a:p>
-          <a:p>
+        <p:spPr/>
+        <p:txBody>
+          <a:bodyPr/>
+          <a:lstStyle/>
+          <a:p>
+            <a:r>
+              <a:rPr lang="en-US" dirty="0" smtClean="0"/>
+              <a:t>Showing how easy it is to “extract” html data</a:t>
+            </a:r>
+          </a:p>
+          <a:p>
+            <a:r>
+              <a:rPr lang="en-US" dirty="0" smtClean="0"/>
+              <a:t>Showing how easy it is to “extract” </a:t>
+            </a:r>
+            <a:r>
+              <a:rPr lang="en-US" dirty="0" err="1" smtClean="0"/>
+              <a:t>css</a:t>
+            </a:r>
+            <a:r>
+              <a:rPr lang="en-US" dirty="0" smtClean="0"/>
+              <a:t> data</a:t>
+            </a:r>
+          </a:p>
+          <a:p>
+            <a:r>
+              <a:rPr lang="en-US" dirty="0" smtClean="0"/>
+              <a:t>Show how to manipulate </a:t>
+            </a:r>
+            <a:r>
+              <a:rPr lang="en-US" dirty="0" err="1" smtClean="0"/>
+              <a:t>css</a:t>
+            </a:r>
+            <a:r>
+              <a:rPr lang="en-US" dirty="0" smtClean="0"/>
+              <a:t> or html directly through the DOM</a:t>
+            </a:r>
             <a:endParaRPr lang="en-US" dirty="0"/>
           </a:p>
         </p:txBody>
@@ -4834,7 +4948,7 @@
     </p:spTree>
     <p:extLst>
       <p:ext uri="{BB962C8B-B14F-4D97-AF65-F5344CB8AC3E}">
-        <p14:creationId xmlns:p14="http://schemas.microsoft.com/office/powerpoint/2010/main" val="1946294190"/>
+        <p14:creationId xmlns:p14="http://schemas.microsoft.com/office/powerpoint/2010/main" val="3448334027"/>
       </p:ext>
     </p:extLst>
   </p:cSld>
@@ -4878,7 +4992,7 @@
           <a:p>
             <a:r>
               <a:rPr lang="en-US" dirty="0" smtClean="0"/>
-              <a:t>Scraping Basics</a:t>
+              <a:t>Explain the DOM and Console: your best friends</a:t>
             </a:r>
             <a:endParaRPr lang="en-US" dirty="0"/>
           </a:p>
@@ -4901,35 +5015,19 @@
           <a:p>
             <a:r>
               <a:rPr lang="en-US" dirty="0" smtClean="0"/>
-              <a:t>Showing how easy it is to “extract” html data</a:t>
-            </a:r>
-          </a:p>
-          <a:p>
-            <a:r>
-              <a:rPr lang="en-US" dirty="0" smtClean="0"/>
-              <a:t>Showing how easy it is to “extract” </a:t>
-            </a:r>
-            <a:r>
-              <a:rPr lang="en-US" dirty="0" err="1" smtClean="0"/>
-              <a:t>css</a:t>
-            </a:r>
-            <a:r>
-              <a:rPr lang="en-US" dirty="0" smtClean="0"/>
-              <a:t> data</a:t>
-            </a:r>
-          </a:p>
-          <a:p>
-            <a:r>
-              <a:rPr lang="en-US" dirty="0" smtClean="0"/>
-              <a:t>Show how to manipulate </a:t>
-            </a:r>
-            <a:r>
-              <a:rPr lang="en-US" dirty="0" err="1" smtClean="0"/>
-              <a:t>css</a:t>
-            </a:r>
-            <a:r>
-              <a:rPr lang="en-US" dirty="0" smtClean="0"/>
-              <a:t> or html directly through the DOM</a:t>
+              <a:t>Show the inspection properties for an element and talk about what that means</a:t>
+            </a:r>
+          </a:p>
+          <a:p>
+            <a:r>
+              <a:rPr lang="en-US" dirty="0" smtClean="0"/>
+              <a:t>Show where the console is</a:t>
+            </a:r>
+          </a:p>
+          <a:p>
+            <a:r>
+              <a:rPr lang="en-US" dirty="0" smtClean="0"/>
+              <a:t>Type a few things into the console</a:t>
             </a:r>
             <a:endParaRPr lang="en-US" dirty="0"/>
           </a:p>
@@ -4938,7 +5036,7 @@
     </p:spTree>
     <p:extLst>
       <p:ext uri="{BB962C8B-B14F-4D97-AF65-F5344CB8AC3E}">
-        <p14:creationId xmlns:p14="http://schemas.microsoft.com/office/powerpoint/2010/main" val="3448334027"/>
+        <p14:creationId xmlns:p14="http://schemas.microsoft.com/office/powerpoint/2010/main" val="528912967"/>
       </p:ext>
     </p:extLst>
   </p:cSld>
@@ -4982,7 +5080,7 @@
           <a:p>
             <a:r>
               <a:rPr lang="en-US" dirty="0" smtClean="0"/>
-              <a:t>Explain the DOM and Console: your best friends</a:t>
+              <a:t>JavaScript Basics</a:t>
             </a:r>
             <a:endParaRPr lang="en-US" dirty="0"/>
           </a:p>
@@ -5000,33 +5098,72 @@
         </p:nvSpPr>
         <p:spPr/>
         <p:txBody>
-          <a:bodyPr/>
-          <a:lstStyle/>
-          <a:p>
-            <a:r>
-              <a:rPr lang="en-US" dirty="0" smtClean="0"/>
-              <a:t>Show the inspection properties for an element and talk about what that means</a:t>
-            </a:r>
-          </a:p>
-          <a:p>
-            <a:r>
-              <a:rPr lang="en-US" dirty="0" smtClean="0"/>
-              <a:t>Show where the console is</a:t>
-            </a:r>
-          </a:p>
-          <a:p>
-            <a:r>
-              <a:rPr lang="en-US" dirty="0" smtClean="0"/>
-              <a:t>Type a few things into the console</a:t>
-            </a:r>
-            <a:endParaRPr lang="en-US" dirty="0"/>
+          <a:bodyPr>
+            <a:normAutofit/>
+          </a:bodyPr>
+          <a:lstStyle/>
+          <a:p>
+            <a:r>
+              <a:rPr lang="en-US" dirty="0" smtClean="0"/>
+              <a:t>JS documentation is deep and varied, and different browser companies will document their own usage</a:t>
+            </a:r>
+          </a:p>
+          <a:p>
+            <a:r>
+              <a:rPr lang="en-US" dirty="0" smtClean="0"/>
+              <a:t>The best for web standards is Mozilla’s documentation at MDN (they show references to ECMAScript)</a:t>
+            </a:r>
+          </a:p>
+          <a:p>
+            <a:r>
+              <a:rPr lang="en-US" dirty="0" err="1" smtClean="0"/>
+              <a:t>Javascript</a:t>
+            </a:r>
+            <a:r>
+              <a:rPr lang="en-US" dirty="0" smtClean="0"/>
+              <a:t> is used in Node, electron, adobe acrobat, and Apache’s </a:t>
+            </a:r>
+            <a:r>
+              <a:rPr lang="en-US" dirty="0" err="1" smtClean="0"/>
+              <a:t>CouchDB</a:t>
+            </a:r>
+            <a:r>
+              <a:rPr lang="en-US" dirty="0" smtClean="0"/>
+              <a:t> (not just web pages!)</a:t>
+            </a:r>
+          </a:p>
+          <a:p>
+            <a:r>
+              <a:rPr lang="en-US" dirty="0" err="1" smtClean="0"/>
+              <a:t>JSFiddle</a:t>
+            </a:r>
+            <a:r>
+              <a:rPr lang="en-US" dirty="0" smtClean="0"/>
+              <a:t> (or </a:t>
+            </a:r>
+            <a:r>
+              <a:rPr lang="en-US" dirty="0" err="1" smtClean="0"/>
+              <a:t>JSBin</a:t>
+            </a:r>
+            <a:r>
+              <a:rPr lang="en-US" dirty="0" smtClean="0"/>
+              <a:t>) are the best for live-testing </a:t>
+            </a:r>
+            <a:r>
+              <a:rPr lang="en-US" dirty="0" err="1" smtClean="0"/>
+              <a:t>js</a:t>
+            </a:r>
+            <a:r>
+              <a:rPr lang="en-US" dirty="0" smtClean="0"/>
+              <a:t> in small functions or snippets</a:t>
+            </a:r>
           </a:p>
         </p:txBody>
       </p:sp>
     </p:spTree>
     <p:extLst>
       <p:ext uri="{BB962C8B-B14F-4D97-AF65-F5344CB8AC3E}">
-        <p14:creationId xmlns:p14="http://schemas.microsoft.com/office/powerpoint/2010/main" val="528912967"/>
+        <p14:creationId xmlns:p14="http://schemas.microsoft.com/office/powerpoint/2010/main" val="1740952018"/>
       </p:ext>
     </p:extLst>
   </p:cSld>
@@ -5070,7 +5207,7 @@
           <a:p>
             <a:r>
               <a:rPr lang="en-US" dirty="0" smtClean="0"/>
-              <a:t>JavaScript Basics</a:t>
+              <a:t>JavaScript 2.0</a:t>
             </a:r>
             <a:endParaRPr lang="en-US" dirty="0"/>
           </a:p>
@@ -5088,72 +5225,71 @@
         </p:nvSpPr>
         <p:spPr/>
         <p:txBody>
-          <a:bodyPr>
-            <a:normAutofit/>
-          </a:bodyPr>
-          <a:lstStyle/>
-          <a:p>
-            <a:r>
-              <a:rPr lang="en-US" dirty="0" smtClean="0"/>
-              <a:t>JS documentation is deep and varied, and different browser companies will document their own usage</a:t>
-            </a:r>
-          </a:p>
-          <a:p>
-            <a:r>
-              <a:rPr lang="en-US" dirty="0" smtClean="0"/>
-              <a:t>The best for web standards is Mozilla’s documentation at MDN (they show references to ECMAScript)</a:t>
-            </a:r>
-          </a:p>
-          <a:p>
+          <a:bodyPr/>
+          <a:lstStyle/>
+          <a:p>
+            <a:r>
+              <a:rPr lang="en-US" dirty="0" smtClean="0"/>
+              <a:t>Write to the “document” using JS &amp; the console</a:t>
+            </a:r>
+          </a:p>
+          <a:p>
+            <a:r>
+              <a:rPr lang="en-US" dirty="0" smtClean="0"/>
+              <a:t>Inspect the element in HTML/CSS</a:t>
+            </a:r>
+          </a:p>
+          <a:p>
+            <a:r>
+              <a:rPr lang="en-US" dirty="0" smtClean="0"/>
+              <a:t>Access the element using JavaScript</a:t>
+            </a:r>
+          </a:p>
+          <a:p>
+            <a:r>
+              <a:rPr lang="en-US" dirty="0" smtClean="0"/>
+              <a:t>View the properties of the element in the console</a:t>
+            </a:r>
+          </a:p>
+          <a:p>
+            <a:r>
+              <a:rPr lang="en-US" dirty="0" smtClean="0"/>
+              <a:t>Edit the </a:t>
+            </a:r>
             <a:r>
               <a:rPr lang="en-US" dirty="0" err="1" smtClean="0"/>
-              <a:t>Javascript</a:t>
-            </a:r>
-            <a:r>
-              <a:rPr lang="en-US" dirty="0" smtClean="0"/>
-              <a:t> is used in Node, electron, adobe acrobat, and Apache’s </a:t>
-            </a:r>
-            <a:r>
-              <a:rPr lang="en-US" dirty="0" err="1" smtClean="0"/>
-              <a:t>CouchDB</a:t>
-            </a:r>
-            <a:r>
-              <a:rPr lang="en-US" dirty="0" smtClean="0"/>
-              <a:t> (not just web pages!)</a:t>
-            </a:r>
-          </a:p>
-          <a:p>
-            <a:r>
-              <a:rPr lang="en-US" dirty="0" err="1" smtClean="0"/>
-              <a:t>JSFiddle</a:t>
-            </a:r>
-            <a:r>
-              <a:rPr lang="en-US" dirty="0" smtClean="0"/>
-              <a:t> (or </a:t>
-            </a:r>
-            <a:r>
-              <a:rPr lang="en-US" dirty="0" err="1" smtClean="0"/>
-              <a:t>JSBin</a:t>
-            </a:r>
-            <a:r>
-              <a:rPr lang="en-US" dirty="0" smtClean="0"/>
-              <a:t>) are the best for live-testing </a:t>
-            </a:r>
-            <a:r>
-              <a:rPr lang="en-US" dirty="0" err="1" smtClean="0"/>
-              <a:t>js</a:t>
-            </a:r>
-            <a:r>
-              <a:rPr lang="en-US" dirty="0" smtClean="0"/>
-              <a:t> in small functions or snippets</a:t>
-            </a:r>
+              <a:t>innerhtml</a:t>
+            </a:r>
+            <a:r>
+              <a:rPr lang="en-US" dirty="0" smtClean="0"/>
+              <a:t> of the element</a:t>
+            </a:r>
+          </a:p>
+          <a:p>
+            <a:r>
+              <a:rPr lang="en-US" dirty="0" smtClean="0"/>
+              <a:t>Create a new element using JavaScript</a:t>
+            </a:r>
+          </a:p>
+          <a:p>
+            <a:r>
+              <a:rPr lang="en-US" dirty="0" smtClean="0"/>
+              <a:t>Assign a class to the new element</a:t>
+            </a:r>
+          </a:p>
+          <a:p>
+            <a:r>
+              <a:rPr lang="en-US" dirty="0" smtClean="0"/>
+              <a:t>Adjust the style using JavaScript, show it as inline</a:t>
+            </a:r>
+            <a:endParaRPr lang="en-US" dirty="0"/>
           </a:p>
         </p:txBody>
       </p:sp>
     </p:spTree>
     <p:extLst>
       <p:ext uri="{BB962C8B-B14F-4D97-AF65-F5344CB8AC3E}">
-        <p14:creationId xmlns:p14="http://schemas.microsoft.com/office/powerpoint/2010/main" val="1740952018"/>
+        <p14:creationId xmlns:p14="http://schemas.microsoft.com/office/powerpoint/2010/main" val="20389981"/>
       </p:ext>
     </p:extLst>
   </p:cSld>
@@ -5197,7 +5333,7 @@
           <a:p>
             <a:r>
               <a:rPr lang="en-US" dirty="0" smtClean="0"/>
-              <a:t>JavaScript 2.0</a:t>
+              <a:t>Challenge #2</a:t>
             </a:r>
             <a:endParaRPr lang="en-US" dirty="0"/>
           </a:p>
@@ -5220,66 +5356,99 @@
           <a:p>
             <a:r>
               <a:rPr lang="en-US" dirty="0" smtClean="0"/>
-              <a:t>Write to the “document” using JS &amp; the console</a:t>
-            </a:r>
-          </a:p>
-          <a:p>
-            <a:r>
-              <a:rPr lang="en-US" dirty="0" smtClean="0"/>
-              <a:t>Inspect the element in HTML/CSS</a:t>
-            </a:r>
-          </a:p>
-          <a:p>
-            <a:r>
-              <a:rPr lang="en-US" dirty="0" smtClean="0"/>
-              <a:t>Access the element using JavaScript</a:t>
-            </a:r>
-          </a:p>
-          <a:p>
-            <a:r>
-              <a:rPr lang="en-US" dirty="0" smtClean="0"/>
-              <a:t>View the properties of the element in the console</a:t>
-            </a:r>
-          </a:p>
-          <a:p>
-            <a:r>
-              <a:rPr lang="en-US" dirty="0" smtClean="0"/>
-              <a:t>Edit the </a:t>
+              <a:t>Go to google.com</a:t>
+            </a:r>
+          </a:p>
+          <a:p>
+            <a:r>
+              <a:rPr lang="en-US" dirty="0" smtClean="0"/>
+              <a:t>Change the background color to “</a:t>
             </a:r>
             <a:r>
               <a:rPr lang="en-US" dirty="0" err="1" smtClean="0"/>
-              <a:t>innerhtml</a:t>
-            </a:r>
-            <a:r>
-              <a:rPr lang="en-US" dirty="0" smtClean="0"/>
-              <a:t> of the element</a:t>
-            </a:r>
-          </a:p>
-          <a:p>
-            <a:r>
-              <a:rPr lang="en-US" dirty="0" smtClean="0"/>
-              <a:t>Create a new element using JavaScript</a:t>
-            </a:r>
-          </a:p>
-          <a:p>
-            <a:r>
-              <a:rPr lang="en-US" dirty="0" smtClean="0"/>
-              <a:t>Assign a class to the new element</a:t>
-            </a:r>
-          </a:p>
-          <a:p>
-            <a:r>
-              <a:rPr lang="en-US" dirty="0" smtClean="0"/>
-              <a:t>Adjust the style using JavaScript, show it as inline</a:t>
+              <a:t>lemonchiffon</a:t>
+            </a:r>
+            <a:r>
+              <a:rPr lang="en-US" dirty="0" smtClean="0"/>
+              <a:t>”</a:t>
+            </a:r>
+          </a:p>
+          <a:p>
+            <a:endParaRPr lang="en-US" dirty="0" smtClean="0"/>
+          </a:p>
+          <a:p>
+            <a:r>
+              <a:rPr lang="en-US" dirty="0" smtClean="0"/>
+              <a:t>Bonus:</a:t>
             </a:r>
             <a:endParaRPr lang="en-US" dirty="0"/>
+          </a:p>
+          <a:p>
+            <a:pPr lvl="1"/>
+            <a:r>
+              <a:rPr lang="en-US" dirty="0" smtClean="0"/>
+              <a:t>Change </a:t>
+            </a:r>
+            <a:r>
+              <a:rPr lang="en-US" dirty="0" smtClean="0"/>
+              <a:t>the header image to this </a:t>
+            </a:r>
+            <a:r>
+              <a:rPr lang="en-US" dirty="0" smtClean="0"/>
+              <a:t>image and fix the styling:</a:t>
+            </a:r>
+            <a:endParaRPr lang="en-US" dirty="0" smtClean="0"/>
+          </a:p>
+          <a:p>
+            <a:pPr lvl="2"/>
+            <a:r>
+              <a:rPr lang="en-US" sz="2800" b="1" dirty="0"/>
+              <a:t>https://</a:t>
+            </a:r>
+            <a:r>
+              <a:rPr lang="en-US" sz="2800" b="1" dirty="0" smtClean="0"/>
+              <a:t>bit.ly/2FRr8L1</a:t>
+            </a:r>
+          </a:p>
+          <a:p>
+            <a:pPr lvl="2"/>
+            <a:r>
+              <a:rPr lang="en-US" dirty="0" smtClean="0"/>
+              <a:t>Hint: remove the “</a:t>
+            </a:r>
+            <a:r>
+              <a:rPr lang="en-US" dirty="0" err="1" smtClean="0"/>
+              <a:t>srcset</a:t>
+            </a:r>
+            <a:r>
+              <a:rPr lang="en-US" dirty="0" smtClean="0"/>
+              <a:t>” tag altogether and just use </a:t>
+            </a:r>
+            <a:r>
+              <a:rPr lang="en-US" dirty="0" err="1" smtClean="0"/>
+              <a:t>src</a:t>
+            </a:r>
+            <a:r>
+              <a:rPr lang="en-US" dirty="0" smtClean="0"/>
+              <a:t>, height, and width</a:t>
+            </a:r>
+          </a:p>
+          <a:p>
+            <a:endParaRPr lang="en-US" dirty="0" smtClean="0"/>
+          </a:p>
+          <a:p>
+            <a:r>
+              <a:rPr lang="en-US" dirty="0" smtClean="0"/>
+              <a:t>Solution is in the “answers” folder</a:t>
+            </a:r>
+            <a:endParaRPr lang="en-US" dirty="0" smtClean="0"/>
           </a:p>
         </p:txBody>
       </p:sp>
     </p:spTree>
     <p:extLst>
       <p:ext uri="{BB962C8B-B14F-4D97-AF65-F5344CB8AC3E}">
-        <p14:creationId xmlns:p14="http://schemas.microsoft.com/office/powerpoint/2010/main" val="20389981"/>
+        <p14:creationId xmlns:p14="http://schemas.microsoft.com/office/powerpoint/2010/main" val="4192706341"/>
       </p:ext>
     </p:extLst>
   </p:cSld>
@@ -5313,17 +5482,17 @@
             <a:spLocks noGrp="1"/>
           </p:cNvSpPr>
           <p:nvPr>
-            <p:ph type="title"/>
-          </p:nvPr>
-        </p:nvSpPr>
-        <p:spPr/>
-        <p:txBody>
-          <a:bodyPr/>
-          <a:lstStyle/>
-          <a:p>
-            <a:r>
-              <a:rPr lang="en-US" dirty="0" smtClean="0"/>
-              <a:t>Challenge #2</a:t>
+            <p:ph type="ctrTitle"/>
+          </p:nvPr>
+        </p:nvSpPr>
+        <p:spPr/>
+        <p:txBody>
+          <a:bodyPr/>
+          <a:lstStyle/>
+          <a:p>
+            <a:r>
+              <a:rPr lang="en-US" dirty="0" smtClean="0"/>
+              <a:t>Optional Content</a:t>
             </a:r>
             <a:endParaRPr lang="en-US" dirty="0"/>
           </a:p>
@@ -5336,56 +5505,26 @@
             <a:spLocks noGrp="1"/>
           </p:cNvSpPr>
           <p:nvPr>
-            <p:ph idx="1"/>
-          </p:nvPr>
-        </p:nvSpPr>
-        <p:spPr/>
-        <p:txBody>
-          <a:bodyPr/>
-          <a:lstStyle/>
-          <a:p>
-            <a:r>
-              <a:rPr lang="en-US" dirty="0" smtClean="0"/>
-              <a:t>Go to google.com</a:t>
-            </a:r>
-          </a:p>
-          <a:p>
-            <a:r>
-              <a:rPr lang="en-US" dirty="0" smtClean="0"/>
-              <a:t>Change the background color to “</a:t>
-            </a:r>
-            <a:r>
-              <a:rPr lang="en-US" dirty="0" err="1" smtClean="0"/>
-              <a:t>lemonchiffon</a:t>
-            </a:r>
-            <a:r>
-              <a:rPr lang="en-US" dirty="0" smtClean="0"/>
-              <a:t>”</a:t>
-            </a:r>
-          </a:p>
-          <a:p>
-            <a:r>
-              <a:rPr lang="en-US" dirty="0" smtClean="0"/>
-              <a:t>Change the header image to this image:</a:t>
-            </a:r>
-          </a:p>
-          <a:p>
-            <a:pPr lvl="1"/>
-            <a:r>
-              <a:rPr lang="en-US" dirty="0"/>
-              <a:t>http://</a:t>
-            </a:r>
-            <a:r>
-              <a:rPr lang="en-US" dirty="0" smtClean="0"/>
-              <a:t>bit.ly/2rdwZYJ</a:t>
-            </a:r>
+            <p:ph type="subTitle" idx="1"/>
+          </p:nvPr>
+        </p:nvSpPr>
+        <p:spPr/>
+        <p:txBody>
+          <a:bodyPr/>
+          <a:lstStyle/>
+          <a:p>
+            <a:r>
+              <a:rPr lang="en-US" dirty="0" smtClean="0"/>
+              <a:t>Content after this slide extends the workshop to 2.5-3 hours.</a:t>
+            </a:r>
+            <a:endParaRPr lang="en-US" dirty="0"/>
           </a:p>
         </p:txBody>
       </p:sp>
     </p:spTree>
     <p:extLst>
       <p:ext uri="{BB962C8B-B14F-4D97-AF65-F5344CB8AC3E}">
-        <p14:creationId xmlns:p14="http://schemas.microsoft.com/office/powerpoint/2010/main" val="4192706341"/>
+        <p14:creationId xmlns:p14="http://schemas.microsoft.com/office/powerpoint/2010/main" val="3788376843"/>
       </p:ext>
     </p:extLst>
   </p:cSld>
@@ -5725,7 +5864,11 @@
             <a:pPr algn="ctr"/>
             <a:r>
               <a:rPr lang="en-US" dirty="0" smtClean="0"/>
-              <a:t>What the heck is web technology?</a:t>
+              <a:t>What the heck is </a:t>
+            </a:r>
+            <a:r>
+              <a:rPr lang="en-US" dirty="0" smtClean="0"/>
+              <a:t>“web technology”?</a:t>
             </a:r>
             <a:endParaRPr lang="en-US" dirty="0"/>
           </a:p>
@@ -6187,66 +6330,6 @@
 </file>
 
 <file path=ppt/slides/slide7.xml><?xml version="1.0" encoding="utf-8"?>
-<p:sld xmlns:a="http://schemas.openxmlformats.org/drawingml/2006/main" xmlns:r="http://schemas.openxmlformats.org/officeDocument/2006/relationships" xmlns:p="http://schemas.openxmlformats.org/presentationml/2006/main">
-  <p:cSld>
-    <p:spTree>
-      <p:nvGrpSpPr>
-        <p:cNvPr id="1" name=""/>
-        <p:cNvGrpSpPr/>
-        <p:nvPr/>
-      </p:nvGrpSpPr>
-      <p:grpSpPr>
-        <a:xfrm>
-          <a:off x="0" y="0"/>
-          <a:ext cx="0" cy="0"/>
-          <a:chOff x="0" y="0"/>
-          <a:chExt cx="0" cy="0"/>
-        </a:xfrm>
-      </p:grpSpPr>
-      <p:pic>
-        <p:nvPicPr>
-          <p:cNvPr id="4" name="Picture 3"/>
-          <p:cNvPicPr>
-            <a:picLocks noChangeAspect="1"/>
-          </p:cNvPicPr>
-          <p:nvPr/>
-        </p:nvPicPr>
-        <p:blipFill>
-          <a:blip r:embed="rId3">
-            <a:extLst>
-              <a:ext uri="{28A0092B-C50C-407E-A947-70E740481C1C}">
-                <a14:useLocalDpi xmlns:a14="http://schemas.microsoft.com/office/drawing/2010/main" val="0"/>
-              </a:ext>
-            </a:extLst>
-          </a:blip>
-          <a:stretch>
-            <a:fillRect/>
-          </a:stretch>
-        </p:blipFill>
-        <p:spPr>
-          <a:xfrm>
-            <a:off x="1524000" y="0"/>
-            <a:ext cx="9144000" cy="6858000"/>
-          </a:xfrm>
-          <a:prstGeom prst="rect">
-            <a:avLst/>
-          </a:prstGeom>
-        </p:spPr>
-      </p:pic>
-    </p:spTree>
-    <p:extLst>
-      <p:ext uri="{BB962C8B-B14F-4D97-AF65-F5344CB8AC3E}">
-        <p14:creationId xmlns:p14="http://schemas.microsoft.com/office/powerpoint/2010/main" val="225549929"/>
-      </p:ext>
-    </p:extLst>
-  </p:cSld>
-  <p:clrMapOvr>
-    <a:masterClrMapping/>
-  </p:clrMapOvr>
-</p:sld>
-</file>
-
-<file path=ppt/slides/slide8.xml><?xml version="1.0" encoding="utf-8"?>
 <p:sld xmlns:a="http://schemas.openxmlformats.org/drawingml/2006/main" xmlns:r="http://schemas.openxmlformats.org/officeDocument/2006/relationships" xmlns:p="http://schemas.openxmlformats.org/presentationml/2006/main">
   <p:cSld>
     <p:spTree>
@@ -6514,6 +6597,65 @@
 </p:sld>
 </file>
 
+<file path=ppt/slides/slide8.xml><?xml version="1.0" encoding="utf-8"?>
+<p:sld xmlns:a="http://schemas.openxmlformats.org/drawingml/2006/main" xmlns:r="http://schemas.openxmlformats.org/officeDocument/2006/relationships" xmlns:p="http://schemas.openxmlformats.org/presentationml/2006/main">
+  <p:cSld>
+    <p:spTree>
+      <p:nvGrpSpPr>
+        <p:cNvPr id="1" name=""/>
+        <p:cNvGrpSpPr/>
+        <p:nvPr/>
+      </p:nvGrpSpPr>
+      <p:grpSpPr>
+        <a:xfrm>
+          <a:off x="0" y="0"/>
+          <a:ext cx="0" cy="0"/>
+          <a:chOff x="0" y="0"/>
+          <a:chExt cx="0" cy="0"/>
+        </a:xfrm>
+      </p:grpSpPr>
+      <p:sp>
+        <p:nvSpPr>
+          <p:cNvPr id="2" name="Title 1"/>
+          <p:cNvSpPr>
+            <a:spLocks noGrp="1"/>
+          </p:cNvSpPr>
+          <p:nvPr>
+            <p:ph type="title"/>
+          </p:nvPr>
+        </p:nvSpPr>
+        <p:spPr>
+          <a:xfrm>
+            <a:off x="763555" y="2455182"/>
+            <a:ext cx="10515600" cy="1325563"/>
+          </a:xfrm>
+        </p:spPr>
+        <p:txBody>
+          <a:bodyPr/>
+          <a:lstStyle/>
+          <a:p>
+            <a:pPr algn="ctr"/>
+            <a:r>
+              <a:rPr lang="en-US" sz="8000" dirty="0" smtClean="0"/>
+              <a:t>Walkthrough</a:t>
+            </a:r>
+            <a:endParaRPr lang="en-US" dirty="0"/>
+          </a:p>
+        </p:txBody>
+      </p:sp>
+    </p:spTree>
+    <p:extLst>
+      <p:ext uri="{BB962C8B-B14F-4D97-AF65-F5344CB8AC3E}">
+        <p14:creationId xmlns:p14="http://schemas.microsoft.com/office/powerpoint/2010/main" val="1797200213"/>
+      </p:ext>
+    </p:extLst>
+  </p:cSld>
+  <p:clrMapOvr>
+    <a:masterClrMapping/>
+  </p:clrMapOvr>
+</p:sld>
+</file>
+
 <file path=ppt/slides/slide9.xml><?xml version="1.0" encoding="utf-8"?>
 <p:sld xmlns:a="http://schemas.openxmlformats.org/drawingml/2006/main" xmlns:r="http://schemas.openxmlformats.org/officeDocument/2006/relationships" xmlns:p="http://schemas.openxmlformats.org/presentationml/2006/main">
   <p:cSld>
@@ -6541,29 +6683,75 @@
             <p:ph type="title"/>
           </p:nvPr>
         </p:nvSpPr>
-        <p:spPr>
-          <a:xfrm>
-            <a:off x="763555" y="2455182"/>
-            <a:ext cx="10515600" cy="1325563"/>
-          </a:xfrm>
-        </p:spPr>
-        <p:txBody>
-          <a:bodyPr/>
-          <a:lstStyle/>
-          <a:p>
-            <a:pPr algn="ctr"/>
-            <a:r>
-              <a:rPr lang="en-US" sz="8000" dirty="0" smtClean="0"/>
-              <a:t>Walkthrough</a:t>
+        <p:spPr/>
+        <p:txBody>
+          <a:bodyPr/>
+          <a:lstStyle/>
+          <a:p>
+            <a:r>
+              <a:rPr lang="en-US" dirty="0" smtClean="0"/>
+              <a:t>HTML Basics</a:t>
             </a:r>
             <a:endParaRPr lang="en-US" dirty="0"/>
+          </a:p>
+        </p:txBody>
+      </p:sp>
+      <p:sp>
+        <p:nvSpPr>
+          <p:cNvPr id="3" name="Content Placeholder 2"/>
+          <p:cNvSpPr>
+            <a:spLocks noGrp="1"/>
+          </p:cNvSpPr>
+          <p:nvPr>
+            <p:ph idx="1"/>
+          </p:nvPr>
+        </p:nvSpPr>
+        <p:spPr/>
+        <p:txBody>
+          <a:bodyPr/>
+          <a:lstStyle/>
+          <a:p>
+            <a:r>
+              <a:rPr lang="en-US" dirty="0" smtClean="0"/>
+              <a:t>Using a text editor to create a file that the browser can read</a:t>
+            </a:r>
+          </a:p>
+          <a:p>
+            <a:r>
+              <a:rPr lang="en-US" dirty="0" smtClean="0"/>
+              <a:t>Inspecting the element in the browser, explaining elements</a:t>
+            </a:r>
+          </a:p>
+          <a:p>
+            <a:r>
+              <a:rPr lang="en-US" dirty="0" smtClean="0"/>
+              <a:t>Recreating the file, this time with actual markup!</a:t>
+            </a:r>
+          </a:p>
+          <a:p>
+            <a:r>
+              <a:rPr lang="en-US" dirty="0" smtClean="0"/>
+              <a:t>Inspecting the element again, showing how it is the same</a:t>
+            </a:r>
+          </a:p>
+          <a:p>
+            <a:r>
+              <a:rPr lang="en-US" dirty="0" smtClean="0"/>
+              <a:t>Explaining what HTML stands for and what its purpose is</a:t>
+            </a:r>
+          </a:p>
+          <a:p>
+            <a:r>
+              <a:rPr lang="en-US" dirty="0" smtClean="0"/>
+              <a:t>Showing what a basic HTML file could look like</a:t>
+            </a:r>
           </a:p>
         </p:txBody>
       </p:sp>
     </p:spTree>
     <p:extLst>
       <p:ext uri="{BB962C8B-B14F-4D97-AF65-F5344CB8AC3E}">
-        <p14:creationId xmlns:p14="http://schemas.microsoft.com/office/powerpoint/2010/main" val="1797200213"/>
+        <p14:creationId xmlns:p14="http://schemas.microsoft.com/office/powerpoint/2010/main" val="3818386909"/>
       </p:ext>
     </p:extLst>
   </p:cSld>

</xml_diff>

<commit_message>
added new stack graphic
</commit_message>
<xml_diff>
--- a/intro to web.pptx
+++ b/intro to web.pptx
@@ -12,7 +12,7 @@
     <p:sldId id="277" r:id="rId3"/>
     <p:sldId id="259" r:id="rId4"/>
     <p:sldId id="257" r:id="rId5"/>
-    <p:sldId id="258" r:id="rId6"/>
+    <p:sldId id="279" r:id="rId6"/>
     <p:sldId id="260" r:id="rId7"/>
     <p:sldId id="262" r:id="rId8"/>
     <p:sldId id="269" r:id="rId9"/>
@@ -717,40 +717,6 @@
           <a:bodyPr/>
           <a:lstStyle/>
           <a:p>
-            <a:r>
-              <a:rPr lang="en-US" dirty="0" smtClean="0"/>
-              <a:t>There are four basic “layers” to what I will be calling</a:t>
-            </a:r>
-            <a:r>
-              <a:rPr lang="en-US" baseline="0" dirty="0" smtClean="0"/>
-              <a:t> the “web technology stack” (and arguably more if you consider user research and design its own layer). </a:t>
-            </a:r>
-          </a:p>
-          <a:p>
-            <a:r>
-              <a:rPr lang="en-US" baseline="0" dirty="0" smtClean="0"/>
-              <a:t>Each layer in the stack has its own technologies and considerations. Each layer gains more and more solutions, libraries, modules, languages, and packages every year. It’s crazy to imagine where the web will be in a few years from now.</a:t>
-            </a:r>
-          </a:p>
-          <a:p>
-            <a:r>
-              <a:rPr lang="en-US" baseline="0" dirty="0" smtClean="0"/>
-              <a:t>Each layer is it’s own universe of complexity. I tend to develop mostly in the frontend and a little on backend and </a:t>
-            </a:r>
-            <a:r>
-              <a:rPr lang="en-US" baseline="0" dirty="0" err="1" smtClean="0"/>
-              <a:t>db</a:t>
-            </a:r>
-            <a:r>
-              <a:rPr lang="en-US" baseline="0" dirty="0" smtClean="0"/>
-              <a:t> services.</a:t>
-            </a:r>
-          </a:p>
-          <a:p>
-            <a:r>
-              <a:rPr lang="en-US" baseline="0" dirty="0" smtClean="0"/>
-              <a:t>So, how do I make this workshop relevant to someone who will want to do something using web technology and not have to relearn things every time they want to visualize data, web scrape, or just edit their portfolio or CV website?</a:t>
-            </a:r>
             <a:endParaRPr lang="en-US" dirty="0"/>
           </a:p>
         </p:txBody>
@@ -770,18 +736,78 @@
           <a:bodyPr/>
           <a:lstStyle/>
           <a:p>
+            <a:pPr marL="0" marR="0" lvl="0" indent="0" algn="r" defTabSz="457200" rtl="0" eaLnBrk="1" fontAlgn="auto" latinLnBrk="0" hangingPunct="1">
+              <a:lnSpc>
+                <a:spcPct val="100000"/>
+              </a:lnSpc>
+              <a:spcBef>
+                <a:spcPts val="0"/>
+              </a:spcBef>
+              <a:spcAft>
+                <a:spcPts val="0"/>
+              </a:spcAft>
+              <a:buClrTx/>
+              <a:buSzTx/>
+              <a:buFontTx/>
+              <a:buNone/>
+              <a:tabLst/>
+              <a:defRPr/>
+            </a:pPr>
             <a:fld id="{AE889E9D-53EF-4B68-80FA-0082D8AB9020}" type="slidenum">
-              <a:rPr lang="en-US" smtClean="0"/>
+              <a:rPr kumimoji="0" lang="en-US" sz="1200" b="0" i="0" u="none" strike="noStrike" kern="1200" cap="none" spc="0" normalizeH="0" baseline="0" noProof="0" smtClean="0">
+                <a:ln>
+                  <a:noFill/>
+                </a:ln>
+                <a:solidFill>
+                  <a:prstClr val="black"/>
+                </a:solidFill>
+                <a:effectLst/>
+                <a:uLnTx/>
+                <a:uFillTx/>
+                <a:latin typeface="Calibri" panose="020F0502020204030204"/>
+                <a:ea typeface="+mn-ea"/>
+                <a:cs typeface="+mn-cs"/>
+              </a:rPr>
+              <a:pPr marL="0" marR="0" lvl="0" indent="0" algn="r" defTabSz="457200" rtl="0" eaLnBrk="1" fontAlgn="auto" latinLnBrk="0" hangingPunct="1">
+                <a:lnSpc>
+                  <a:spcPct val="100000"/>
+                </a:lnSpc>
+                <a:spcBef>
+                  <a:spcPts val="0"/>
+                </a:spcBef>
+                <a:spcAft>
+                  <a:spcPts val="0"/>
+                </a:spcAft>
+                <a:buClrTx/>
+                <a:buSzTx/>
+                <a:buFontTx/>
+                <a:buNone/>
+                <a:tabLst/>
+                <a:defRPr/>
+              </a:pPr>
               <a:t>5</a:t>
             </a:fld>
-            <a:endParaRPr lang="en-US"/>
+            <a:endParaRPr kumimoji="0" lang="en-US" sz="1200" b="0" i="0" u="none" strike="noStrike" kern="1200" cap="none" spc="0" normalizeH="0" baseline="0" noProof="0">
+              <a:ln>
+                <a:noFill/>
+              </a:ln>
+              <a:solidFill>
+                <a:prstClr val="black"/>
+              </a:solidFill>
+              <a:effectLst/>
+              <a:uLnTx/>
+              <a:uFillTx/>
+              <a:latin typeface="Calibri" panose="020F0502020204030204"/>
+              <a:ea typeface="+mn-ea"/>
+              <a:cs typeface="+mn-cs"/>
+            </a:endParaRPr>
           </a:p>
         </p:txBody>
       </p:sp>
     </p:spTree>
     <p:extLst>
       <p:ext uri="{BB962C8B-B14F-4D97-AF65-F5344CB8AC3E}">
-        <p14:creationId xmlns:p14="http://schemas.microsoft.com/office/powerpoint/2010/main" val="2512529299"/>
+        <p14:creationId xmlns:p14="http://schemas.microsoft.com/office/powerpoint/2010/main" val="2510908493"/>
       </p:ext>
     </p:extLst>
   </p:cSld>
@@ -4741,15 +4767,7 @@
           <a:p>
             <a:r>
               <a:rPr lang="en-US" dirty="0" smtClean="0"/>
-              <a:t>Style these using a CSS document, </a:t>
-            </a:r>
-            <a:r>
-              <a:rPr lang="en-US" dirty="0" smtClean="0"/>
-              <a:t>not inline or &lt;style&gt; </a:t>
-            </a:r>
-            <a:r>
-              <a:rPr lang="en-US" dirty="0" smtClean="0"/>
-              <a:t>HTML</a:t>
+              <a:t>Style these using a CSS document, not inline or &lt;style&gt; HTML</a:t>
             </a:r>
           </a:p>
           <a:p>
@@ -4775,11 +4793,7 @@
             <a:pPr lvl="1"/>
             <a:r>
               <a:rPr lang="en-US" dirty="0" smtClean="0"/>
-              <a:t>Make the </a:t>
-            </a:r>
-            <a:r>
-              <a:rPr lang="en-US" dirty="0" smtClean="0"/>
-              <a:t>first element’s </a:t>
+              <a:t>Make the first element’s </a:t>
             </a:r>
             <a:r>
               <a:rPr lang="en-US" i="1" dirty="0" smtClean="0"/>
@@ -4787,15 +4801,7 @@
             </a:r>
             <a:r>
               <a:rPr lang="en-US" dirty="0" smtClean="0"/>
-              <a:t> </a:t>
-            </a:r>
-            <a:r>
-              <a:rPr lang="en-US" dirty="0" smtClean="0"/>
-              <a:t>size</a:t>
-            </a:r>
-            <a:r>
-              <a:rPr lang="en-US" dirty="0" smtClean="0"/>
-              <a:t> 500 and </a:t>
+              <a:t> size 500 and </a:t>
             </a:r>
             <a:r>
               <a:rPr lang="en-US" i="1" dirty="0" smtClean="0"/>
@@ -4811,22 +4817,14 @@
             </a:r>
             <a:r>
               <a:rPr lang="en-US" dirty="0" smtClean="0"/>
-              <a:t> </a:t>
-            </a:r>
-            <a:r>
-              <a:rPr lang="en-US" dirty="0" smtClean="0"/>
-              <a:t>it will shrink in size if the browser shrinks in size (this is called responsive design)</a:t>
+              <a:t> it will shrink in size if the browser shrinks in size (this is called responsive design)</a:t>
             </a:r>
           </a:p>
           <a:p>
             <a:pPr lvl="1"/>
             <a:r>
               <a:rPr lang="en-US" dirty="0" smtClean="0"/>
-              <a:t>Make the inner element’s size a % of the outer </a:t>
-            </a:r>
-            <a:r>
-              <a:rPr lang="en-US" dirty="0" smtClean="0"/>
-              <a:t>element</a:t>
+              <a:t>Make the inner element’s size a % of the outer element</a:t>
             </a:r>
           </a:p>
           <a:p>
@@ -4834,7 +4832,6 @@
               <a:rPr lang="en-US" dirty="0" smtClean="0"/>
               <a:t>Solution is included in folder “answers”</a:t>
             </a:r>
-            <a:endParaRPr lang="en-US" dirty="0" smtClean="0"/>
           </a:p>
           <a:p>
             <a:endParaRPr lang="en-US" dirty="0"/>
@@ -5387,17 +5384,8 @@
             <a:pPr lvl="1"/>
             <a:r>
               <a:rPr lang="en-US" dirty="0" smtClean="0"/>
-              <a:t>Change </a:t>
-            </a:r>
-            <a:r>
-              <a:rPr lang="en-US" dirty="0" smtClean="0"/>
-              <a:t>the header image to this </a:t>
-            </a:r>
-            <a:r>
-              <a:rPr lang="en-US" dirty="0" smtClean="0"/>
-              <a:t>image and fix the styling:</a:t>
-            </a:r>
-            <a:endParaRPr lang="en-US" dirty="0" smtClean="0"/>
+              <a:t>Change the header image to this image and fix the styling:</a:t>
+            </a:r>
           </a:p>
           <a:p>
             <a:pPr lvl="2"/>
@@ -5441,7 +5429,6 @@
               <a:rPr lang="en-US" dirty="0" smtClean="0"/>
               <a:t>Solution is in the “answers” folder</a:t>
             </a:r>
-            <a:endParaRPr lang="en-US" dirty="0" smtClean="0"/>
           </a:p>
         </p:txBody>
       </p:sp>
@@ -5864,11 +5851,7 @@
             <a:pPr algn="ctr"/>
             <a:r>
               <a:rPr lang="en-US" dirty="0" smtClean="0"/>
-              <a:t>What the heck is </a:t>
-            </a:r>
-            <a:r>
-              <a:rPr lang="en-US" dirty="0" smtClean="0"/>
-              <a:t>“web technology”?</a:t>
+              <a:t>What the heck is “web technology”?</a:t>
             </a:r>
             <a:endParaRPr lang="en-US" dirty="0"/>
           </a:p>
@@ -6034,6 +6017,14 @@
 <file path=ppt/slides/slide5.xml><?xml version="1.0" encoding="utf-8"?>
 <p:sld xmlns:a="http://schemas.openxmlformats.org/drawingml/2006/main" xmlns:r="http://schemas.openxmlformats.org/officeDocument/2006/relationships" xmlns:p="http://schemas.openxmlformats.org/presentationml/2006/main">
   <p:cSld>
+    <p:bg>
+      <p:bgPr>
+        <a:solidFill>
+          <a:srgbClr val="4E4A47"/>
+        </a:solidFill>
+        <a:effectLst/>
+      </p:bgPr>
+    </p:bg>
     <p:spTree>
       <p:nvGrpSpPr>
         <p:cNvPr id="1" name=""/>
@@ -6050,21 +6041,184 @@
       </p:grpSpPr>
       <p:sp>
         <p:nvSpPr>
-          <p:cNvPr id="4" name="Rectangle 3"/>
+          <p:cNvPr id="10" name="Rectangle 9"/>
           <p:cNvSpPr/>
           <p:nvPr/>
         </p:nvSpPr>
         <p:spPr>
           <a:xfrm>
-            <a:off x="1666571" y="483523"/>
-            <a:ext cx="7934630" cy="1342103"/>
+            <a:off x="829733" y="364067"/>
+            <a:ext cx="10557934" cy="6341533"/>
           </a:xfrm>
           <a:prstGeom prst="rect">
             <a:avLst/>
           </a:prstGeom>
           <a:solidFill>
-            <a:schemeClr val="tx1">
-              <a:lumMod val="50000"/>
+            <a:schemeClr val="bg2"/>
+          </a:solidFill>
+          <a:ln>
+            <a:noFill/>
+          </a:ln>
+        </p:spPr>
+        <p:style>
+          <a:lnRef idx="2">
+            <a:schemeClr val="accent1">
+              <a:shade val="50000"/>
+            </a:schemeClr>
+          </a:lnRef>
+          <a:fillRef idx="1">
+            <a:schemeClr val="accent1"/>
+          </a:fillRef>
+          <a:effectRef idx="0">
+            <a:schemeClr val="accent1"/>
+          </a:effectRef>
+          <a:fontRef idx="minor">
+            <a:schemeClr val="lt1"/>
+          </a:fontRef>
+        </p:style>
+        <p:txBody>
+          <a:bodyPr rtlCol="0" anchor="t"/>
+          <a:lstStyle/>
+          <a:p>
+            <a:pPr marL="0" marR="0" lvl="0" indent="0" algn="ctr" defTabSz="457200" rtl="0" eaLnBrk="1" fontAlgn="auto" latinLnBrk="0" hangingPunct="1">
+              <a:lnSpc>
+                <a:spcPct val="100000"/>
+              </a:lnSpc>
+              <a:spcBef>
+                <a:spcPts val="0"/>
+              </a:spcBef>
+              <a:spcAft>
+                <a:spcPts val="0"/>
+              </a:spcAft>
+              <a:buClrTx/>
+              <a:buSzTx/>
+              <a:buFontTx/>
+              <a:buNone/>
+              <a:tabLst/>
+              <a:defRPr/>
+            </a:pPr>
+            <a:r>
+              <a:rPr kumimoji="0" lang="en-US" sz="1800" b="0" i="0" u="none" strike="noStrike" kern="1200" cap="none" spc="0" normalizeH="0" baseline="0" noProof="0" dirty="0" smtClean="0">
+                <a:ln>
+                  <a:noFill/>
+                </a:ln>
+                <a:solidFill>
+                  <a:prstClr val="white"/>
+                </a:solidFill>
+                <a:effectLst/>
+                <a:uLnTx/>
+                <a:uFillTx/>
+                <a:latin typeface="Palatino Linotype" panose="02040502050505030304"/>
+                <a:ea typeface="+mn-ea"/>
+                <a:cs typeface="+mn-cs"/>
+              </a:rPr>
+              <a:t>Framework: </a:t>
+            </a:r>
+          </a:p>
+          <a:p>
+            <a:pPr marL="0" marR="0" lvl="0" indent="0" algn="ctr" defTabSz="457200" rtl="0" eaLnBrk="1" fontAlgn="auto" latinLnBrk="0" hangingPunct="1">
+              <a:lnSpc>
+                <a:spcPct val="100000"/>
+              </a:lnSpc>
+              <a:spcBef>
+                <a:spcPts val="0"/>
+              </a:spcBef>
+              <a:spcAft>
+                <a:spcPts val="0"/>
+              </a:spcAft>
+              <a:buClrTx/>
+              <a:buSzTx/>
+              <a:buFontTx/>
+              <a:buNone/>
+              <a:tabLst/>
+              <a:defRPr/>
+            </a:pPr>
+            <a:r>
+              <a:rPr kumimoji="0" lang="en-US" sz="1800" b="0" i="0" u="none" strike="noStrike" kern="1200" cap="none" spc="0" normalizeH="0" baseline="0" noProof="0" dirty="0" smtClean="0">
+                <a:ln>
+                  <a:noFill/>
+                </a:ln>
+                <a:solidFill>
+                  <a:prstClr val="white"/>
+                </a:solidFill>
+                <a:effectLst/>
+                <a:uLnTx/>
+                <a:uFillTx/>
+                <a:latin typeface="Palatino Linotype" panose="02040502050505030304"/>
+                <a:ea typeface="+mn-ea"/>
+                <a:cs typeface="+mn-cs"/>
+              </a:rPr>
+              <a:t>An </a:t>
+            </a:r>
+            <a:r>
+              <a:rPr kumimoji="0" lang="en-US" sz="1800" b="0" i="1" u="none" strike="noStrike" kern="1200" cap="none" spc="0" normalizeH="0" baseline="0" noProof="0" dirty="0" smtClean="0">
+                <a:ln>
+                  <a:noFill/>
+                </a:ln>
+                <a:solidFill>
+                  <a:prstClr val="white"/>
+                </a:solidFill>
+                <a:effectLst/>
+                <a:uLnTx/>
+                <a:uFillTx/>
+                <a:latin typeface="Palatino Linotype" panose="02040502050505030304"/>
+                <a:ea typeface="+mn-ea"/>
+                <a:cs typeface="+mn-cs"/>
+              </a:rPr>
+              <a:t>optional</a:t>
+            </a:r>
+            <a:r>
+              <a:rPr kumimoji="0" lang="en-US" sz="1800" b="0" i="0" u="none" strike="noStrike" kern="1200" cap="none" spc="0" normalizeH="0" baseline="0" noProof="0" dirty="0" smtClean="0">
+                <a:ln>
+                  <a:noFill/>
+                </a:ln>
+                <a:solidFill>
+                  <a:prstClr val="white"/>
+                </a:solidFill>
+                <a:effectLst/>
+                <a:uLnTx/>
+                <a:uFillTx/>
+                <a:latin typeface="Palatino Linotype" panose="02040502050505030304"/>
+                <a:ea typeface="+mn-ea"/>
+                <a:cs typeface="+mn-cs"/>
+              </a:rPr>
+              <a:t> package, library, methodology, or pattern that determines how these all interact</a:t>
+            </a:r>
+            <a:endParaRPr kumimoji="0" lang="en-US" sz="1800" b="0" i="0" u="none" strike="noStrike" kern="1200" cap="none" spc="0" normalizeH="0" baseline="0" noProof="0" dirty="0">
+              <a:ln>
+                <a:noFill/>
+              </a:ln>
+              <a:solidFill>
+                <a:prstClr val="white"/>
+              </a:solidFill>
+              <a:effectLst/>
+              <a:uLnTx/>
+              <a:uFillTx/>
+              <a:latin typeface="Palatino Linotype" panose="02040502050505030304"/>
+              <a:ea typeface="+mn-ea"/>
+              <a:cs typeface="+mn-cs"/>
+            </a:endParaRPr>
+          </a:p>
+        </p:txBody>
+      </p:sp>
+      <p:sp>
+        <p:nvSpPr>
+          <p:cNvPr id="9" name="Rectangle 8"/>
+          <p:cNvSpPr/>
+          <p:nvPr/>
+        </p:nvSpPr>
+        <p:spPr>
+          <a:xfrm>
+            <a:off x="1261530" y="1049867"/>
+            <a:ext cx="4258734" cy="5367866"/>
+          </a:xfrm>
+          <a:prstGeom prst="rect">
+            <a:avLst/>
+          </a:prstGeom>
+          <a:solidFill>
+            <a:schemeClr val="accent5">
+              <a:lumMod val="20000"/>
+              <a:lumOff val="80000"/>
             </a:schemeClr>
           </a:solidFill>
           <a:ln>
@@ -6088,35 +6242,114 @@
           </a:fontRef>
         </p:style>
         <p:txBody>
-          <a:bodyPr rtlCol="0" anchor="ctr"/>
-          <a:lstStyle/>
-          <a:p>
-            <a:pPr algn="ctr"/>
-            <a:r>
-              <a:rPr lang="en-US" sz="3600" b="1" dirty="0" smtClean="0"/>
-              <a:t>The frontend to the website you see</a:t>
-            </a:r>
-            <a:endParaRPr lang="en-US" sz="3600" b="1" dirty="0"/>
-          </a:p>
-        </p:txBody>
-      </p:sp>
-      <p:sp>
-        <p:nvSpPr>
-          <p:cNvPr id="5" name="Rectangle 4"/>
+          <a:bodyPr rtlCol="0" anchor="t"/>
+          <a:lstStyle/>
+          <a:p>
+            <a:pPr marL="0" marR="0" lvl="0" indent="0" algn="ctr" defTabSz="457200" rtl="0" eaLnBrk="1" fontAlgn="auto" latinLnBrk="0" hangingPunct="1">
+              <a:lnSpc>
+                <a:spcPct val="100000"/>
+              </a:lnSpc>
+              <a:spcBef>
+                <a:spcPts val="0"/>
+              </a:spcBef>
+              <a:spcAft>
+                <a:spcPts val="0"/>
+              </a:spcAft>
+              <a:buClrTx/>
+              <a:buSzTx/>
+              <a:buFontTx/>
+              <a:buNone/>
+              <a:tabLst/>
+              <a:defRPr/>
+            </a:pPr>
+            <a:r>
+              <a:rPr kumimoji="0" lang="en-US" sz="1800" b="1" i="0" u="none" strike="noStrike" kern="1200" cap="none" spc="0" normalizeH="0" baseline="0" noProof="0" dirty="0" smtClean="0">
+                <a:ln>
+                  <a:noFill/>
+                </a:ln>
+                <a:solidFill>
+                  <a:prstClr val="black"/>
+                </a:solidFill>
+                <a:effectLst/>
+                <a:uLnTx/>
+                <a:uFillTx/>
+                <a:latin typeface="Palatino Linotype" panose="02040502050505030304"/>
+                <a:ea typeface="+mn-ea"/>
+                <a:cs typeface="+mn-cs"/>
+              </a:rPr>
+              <a:t>FRONT-END: </a:t>
+            </a:r>
+          </a:p>
+          <a:p>
+            <a:pPr marL="0" marR="0" lvl="0" indent="0" algn="ctr" defTabSz="457200" rtl="0" eaLnBrk="1" fontAlgn="auto" latinLnBrk="0" hangingPunct="1">
+              <a:lnSpc>
+                <a:spcPct val="100000"/>
+              </a:lnSpc>
+              <a:spcBef>
+                <a:spcPts val="0"/>
+              </a:spcBef>
+              <a:spcAft>
+                <a:spcPts val="0"/>
+              </a:spcAft>
+              <a:buClrTx/>
+              <a:buSzTx/>
+              <a:buFontTx/>
+              <a:buNone/>
+              <a:tabLst/>
+              <a:defRPr/>
+            </a:pPr>
+            <a:r>
+              <a:rPr kumimoji="0" lang="en-US" sz="1800" b="0" i="0" u="none" strike="noStrike" kern="1200" cap="none" spc="0" normalizeH="0" baseline="0" noProof="0" dirty="0" smtClean="0">
+                <a:ln>
+                  <a:noFill/>
+                </a:ln>
+                <a:solidFill>
+                  <a:prstClr val="black"/>
+                </a:solidFill>
+                <a:effectLst/>
+                <a:uLnTx/>
+                <a:uFillTx/>
+                <a:latin typeface="Palatino Linotype" panose="02040502050505030304"/>
+                <a:ea typeface="+mn-ea"/>
+                <a:cs typeface="+mn-cs"/>
+              </a:rPr>
+              <a:t>What the user sees</a:t>
+            </a:r>
+            <a:endParaRPr kumimoji="0" lang="en-US" sz="1800" b="0" i="0" u="none" strike="noStrike" kern="1200" cap="none" spc="0" normalizeH="0" baseline="0" noProof="0" dirty="0">
+              <a:ln>
+                <a:noFill/>
+              </a:ln>
+              <a:solidFill>
+                <a:prstClr val="black"/>
+              </a:solidFill>
+              <a:effectLst/>
+              <a:uLnTx/>
+              <a:uFillTx/>
+              <a:latin typeface="Palatino Linotype" panose="02040502050505030304"/>
+              <a:ea typeface="+mn-ea"/>
+              <a:cs typeface="+mn-cs"/>
+            </a:endParaRPr>
+          </a:p>
+        </p:txBody>
+      </p:sp>
+      <p:sp>
+        <p:nvSpPr>
+          <p:cNvPr id="8" name="Rectangle 7"/>
           <p:cNvSpPr/>
           <p:nvPr/>
         </p:nvSpPr>
         <p:spPr>
           <a:xfrm>
-            <a:off x="1961530" y="2007523"/>
-            <a:ext cx="7934630" cy="1342103"/>
+            <a:off x="5520264" y="1049867"/>
+            <a:ext cx="5435600" cy="5367866"/>
           </a:xfrm>
           <a:prstGeom prst="rect">
             <a:avLst/>
           </a:prstGeom>
           <a:solidFill>
-            <a:schemeClr val="tx1">
-              <a:lumMod val="50000"/>
+            <a:schemeClr val="accent5">
+              <a:lumMod val="60000"/>
+              <a:lumOff val="40000"/>
             </a:schemeClr>
           </a:solidFill>
           <a:ln>
@@ -6140,35 +6373,113 @@
           </a:fontRef>
         </p:style>
         <p:txBody>
-          <a:bodyPr rtlCol="0" anchor="ctr"/>
-          <a:lstStyle/>
-          <a:p>
-            <a:pPr algn="ctr"/>
-            <a:r>
-              <a:rPr lang="en-US" sz="3600" b="1" dirty="0" smtClean="0"/>
-              <a:t>The backend logic and web services</a:t>
-            </a:r>
-            <a:endParaRPr lang="en-US" sz="3600" b="1" dirty="0"/>
-          </a:p>
-        </p:txBody>
-      </p:sp>
-      <p:sp>
-        <p:nvSpPr>
-          <p:cNvPr id="6" name="Rectangle 5"/>
+          <a:bodyPr rtlCol="0" anchor="t"/>
+          <a:lstStyle/>
+          <a:p>
+            <a:pPr marL="0" marR="0" lvl="0" indent="0" algn="ctr" defTabSz="457200" rtl="0" eaLnBrk="1" fontAlgn="auto" latinLnBrk="0" hangingPunct="1">
+              <a:lnSpc>
+                <a:spcPct val="100000"/>
+              </a:lnSpc>
+              <a:spcBef>
+                <a:spcPts val="0"/>
+              </a:spcBef>
+              <a:spcAft>
+                <a:spcPts val="0"/>
+              </a:spcAft>
+              <a:buClrTx/>
+              <a:buSzTx/>
+              <a:buFontTx/>
+              <a:buNone/>
+              <a:tabLst/>
+              <a:defRPr/>
+            </a:pPr>
+            <a:r>
+              <a:rPr kumimoji="0" lang="en-US" sz="1800" b="1" i="0" u="none" strike="noStrike" kern="1200" cap="none" spc="0" normalizeH="0" baseline="0" noProof="0" dirty="0" smtClean="0">
+                <a:ln>
+                  <a:noFill/>
+                </a:ln>
+                <a:solidFill>
+                  <a:prstClr val="black"/>
+                </a:solidFill>
+                <a:effectLst/>
+                <a:uLnTx/>
+                <a:uFillTx/>
+                <a:latin typeface="Palatino Linotype" panose="02040502050505030304"/>
+                <a:ea typeface="+mn-ea"/>
+                <a:cs typeface="+mn-cs"/>
+              </a:rPr>
+              <a:t>BACK-END:</a:t>
+            </a:r>
+          </a:p>
+          <a:p>
+            <a:pPr marL="0" marR="0" lvl="0" indent="0" algn="ctr" defTabSz="457200" rtl="0" eaLnBrk="1" fontAlgn="auto" latinLnBrk="0" hangingPunct="1">
+              <a:lnSpc>
+                <a:spcPct val="100000"/>
+              </a:lnSpc>
+              <a:spcBef>
+                <a:spcPts val="0"/>
+              </a:spcBef>
+              <a:spcAft>
+                <a:spcPts val="0"/>
+              </a:spcAft>
+              <a:buClrTx/>
+              <a:buSzTx/>
+              <a:buFontTx/>
+              <a:buNone/>
+              <a:tabLst/>
+              <a:defRPr/>
+            </a:pPr>
+            <a:r>
+              <a:rPr kumimoji="0" lang="en-US" sz="1800" b="0" i="0" u="none" strike="noStrike" kern="1200" cap="none" spc="0" normalizeH="0" baseline="0" noProof="0" dirty="0" smtClean="0">
+                <a:ln>
+                  <a:noFill/>
+                </a:ln>
+                <a:solidFill>
+                  <a:prstClr val="black"/>
+                </a:solidFill>
+                <a:effectLst/>
+                <a:uLnTx/>
+                <a:uFillTx/>
+                <a:latin typeface="Palatino Linotype" panose="02040502050505030304"/>
+                <a:ea typeface="+mn-ea"/>
+                <a:cs typeface="+mn-cs"/>
+              </a:rPr>
+              <a:t>What the user does not see</a:t>
+            </a:r>
+            <a:endParaRPr kumimoji="0" lang="en-US" sz="1800" b="0" i="0" u="none" strike="noStrike" kern="1200" cap="none" spc="0" normalizeH="0" baseline="0" noProof="0" dirty="0">
+              <a:ln>
+                <a:noFill/>
+              </a:ln>
+              <a:solidFill>
+                <a:prstClr val="black"/>
+              </a:solidFill>
+              <a:effectLst/>
+              <a:uLnTx/>
+              <a:uFillTx/>
+              <a:latin typeface="Palatino Linotype" panose="02040502050505030304"/>
+              <a:ea typeface="+mn-ea"/>
+              <a:cs typeface="+mn-cs"/>
+            </a:endParaRPr>
+          </a:p>
+        </p:txBody>
+      </p:sp>
+      <p:sp>
+        <p:nvSpPr>
+          <p:cNvPr id="4" name="5-Point Star 3"/>
           <p:cNvSpPr/>
           <p:nvPr/>
         </p:nvSpPr>
         <p:spPr>
           <a:xfrm>
-            <a:off x="2256489" y="3531523"/>
-            <a:ext cx="7934630" cy="1342103"/>
+            <a:off x="1744129" y="3297763"/>
+            <a:ext cx="1041400" cy="1041400"/>
           </a:xfrm>
-          <a:prstGeom prst="rect">
+          <a:prstGeom prst="star5">
             <a:avLst/>
           </a:prstGeom>
           <a:solidFill>
-            <a:schemeClr val="tx1">
-              <a:lumMod val="50000"/>
+            <a:schemeClr val="accent5">
+              <a:lumMod val="75000"/>
             </a:schemeClr>
           </a:solidFill>
           <a:ln>
@@ -6195,37 +6506,67 @@
           <a:bodyPr rtlCol="0" anchor="ctr"/>
           <a:lstStyle/>
           <a:p>
-            <a:pPr algn="ctr"/>
-            <a:r>
-              <a:rPr lang="en-US" sz="3600" b="1" dirty="0" smtClean="0"/>
-              <a:t>Server logic and data retrieval</a:t>
-            </a:r>
-            <a:endParaRPr lang="en-US" sz="3600" b="1" dirty="0"/>
-          </a:p>
-        </p:txBody>
-      </p:sp>
-      <p:sp>
-        <p:nvSpPr>
-          <p:cNvPr id="7" name="Rectangle 6"/>
+            <a:pPr marL="0" marR="0" lvl="0" indent="0" algn="ctr" defTabSz="457200" rtl="0" eaLnBrk="1" fontAlgn="auto" latinLnBrk="0" hangingPunct="1">
+              <a:lnSpc>
+                <a:spcPct val="100000"/>
+              </a:lnSpc>
+              <a:spcBef>
+                <a:spcPts val="0"/>
+              </a:spcBef>
+              <a:spcAft>
+                <a:spcPts val="0"/>
+              </a:spcAft>
+              <a:buClrTx/>
+              <a:buSzTx/>
+              <a:buFontTx/>
+              <a:buNone/>
+              <a:tabLst/>
+              <a:defRPr/>
+            </a:pPr>
+            <a:endParaRPr kumimoji="0" lang="en-US" sz="1800" b="0" i="0" u="none" strike="noStrike" kern="1200" cap="none" spc="0" normalizeH="0" baseline="0" noProof="0" dirty="0">
+              <a:ln>
+                <a:noFill/>
+              </a:ln>
+              <a:solidFill>
+                <a:prstClr val="black"/>
+              </a:solidFill>
+              <a:effectLst/>
+              <a:uLnTx/>
+              <a:uFillTx/>
+              <a:latin typeface="Palatino Linotype" panose="02040502050505030304"/>
+              <a:ea typeface="+mn-ea"/>
+              <a:cs typeface="+mn-cs"/>
+            </a:endParaRPr>
+          </a:p>
+        </p:txBody>
+      </p:sp>
+      <p:sp>
+        <p:nvSpPr>
+          <p:cNvPr id="5" name="Rectangle 4"/>
           <p:cNvSpPr/>
           <p:nvPr/>
         </p:nvSpPr>
         <p:spPr>
           <a:xfrm>
-            <a:off x="2551449" y="5055523"/>
-            <a:ext cx="7934630" cy="1342103"/>
+            <a:off x="3352796" y="3060696"/>
+            <a:ext cx="2988733" cy="1515533"/>
           </a:xfrm>
           <a:prstGeom prst="rect">
             <a:avLst/>
           </a:prstGeom>
           <a:solidFill>
-            <a:schemeClr val="tx1">
-              <a:lumMod val="50000"/>
-            </a:schemeClr>
+            <a:schemeClr val="tx1"/>
           </a:solidFill>
           <a:ln>
             <a:noFill/>
           </a:ln>
+          <a:effectLst>
+            <a:outerShdw blurRad="76200" dir="18900000" sy="23000" kx="-1200000" algn="bl" rotWithShape="0">
+              <a:prstClr val="black">
+                <a:alpha val="20000"/>
+              </a:prstClr>
+            </a:outerShdw>
+          </a:effectLst>
         </p:spPr>
         <p:style>
           <a:lnRef idx="2">
@@ -6247,19 +6588,385 @@
           <a:bodyPr rtlCol="0" anchor="ctr"/>
           <a:lstStyle/>
           <a:p>
-            <a:pPr algn="ctr"/>
-            <a:r>
-              <a:rPr lang="en-US" sz="3600" b="1" dirty="0" smtClean="0"/>
-              <a:t>The physical infrastructure</a:t>
-            </a:r>
-            <a:endParaRPr lang="en-US" sz="3600" b="1" dirty="0"/>
-          </a:p>
-        </p:txBody>
-      </p:sp>
+            <a:pPr marL="0" marR="0" lvl="0" indent="0" algn="ctr" defTabSz="457200" rtl="0" eaLnBrk="1" fontAlgn="auto" latinLnBrk="0" hangingPunct="1">
+              <a:lnSpc>
+                <a:spcPct val="100000"/>
+              </a:lnSpc>
+              <a:spcBef>
+                <a:spcPts val="0"/>
+              </a:spcBef>
+              <a:spcAft>
+                <a:spcPts val="0"/>
+              </a:spcAft>
+              <a:buClrTx/>
+              <a:buSzTx/>
+              <a:buFontTx/>
+              <a:buNone/>
+              <a:tabLst/>
+              <a:defRPr/>
+            </a:pPr>
+            <a:r>
+              <a:rPr kumimoji="0" lang="en-US" sz="1800" b="1" i="0" u="none" strike="noStrike" kern="1200" cap="none" spc="0" normalizeH="0" baseline="0" noProof="0" dirty="0" smtClean="0">
+                <a:ln>
+                  <a:noFill/>
+                </a:ln>
+                <a:solidFill>
+                  <a:prstClr val="black"/>
+                </a:solidFill>
+                <a:effectLst/>
+                <a:uLnTx/>
+                <a:uFillTx/>
+                <a:latin typeface="Palatino Linotype" panose="02040502050505030304"/>
+                <a:ea typeface="+mn-ea"/>
+                <a:cs typeface="+mn-cs"/>
+              </a:rPr>
+              <a:t>Client-side: </a:t>
+            </a:r>
+            <a:r>
+              <a:rPr kumimoji="0" lang="en-US" sz="1800" b="0" i="0" u="none" strike="noStrike" kern="1200" cap="none" spc="0" normalizeH="0" baseline="0" noProof="0" dirty="0" smtClean="0">
+                <a:ln>
+                  <a:noFill/>
+                </a:ln>
+                <a:solidFill>
+                  <a:prstClr val="black"/>
+                </a:solidFill>
+                <a:effectLst/>
+                <a:uLnTx/>
+                <a:uFillTx/>
+                <a:latin typeface="Palatino Linotype" panose="02040502050505030304"/>
+                <a:ea typeface="+mn-ea"/>
+                <a:cs typeface="+mn-cs"/>
+              </a:rPr>
+              <a:t>the physical location of the technology the user interacts with.</a:t>
+            </a:r>
+            <a:endParaRPr kumimoji="0" lang="en-US" sz="1800" b="0" i="0" u="none" strike="noStrike" kern="1200" cap="none" spc="0" normalizeH="0" baseline="0" noProof="0" dirty="0">
+              <a:ln>
+                <a:noFill/>
+              </a:ln>
+              <a:solidFill>
+                <a:prstClr val="black"/>
+              </a:solidFill>
+              <a:effectLst/>
+              <a:uLnTx/>
+              <a:uFillTx/>
+              <a:latin typeface="Palatino Linotype" panose="02040502050505030304"/>
+              <a:ea typeface="+mn-ea"/>
+              <a:cs typeface="+mn-cs"/>
+            </a:endParaRPr>
+          </a:p>
+        </p:txBody>
+      </p:sp>
+      <p:sp>
+        <p:nvSpPr>
+          <p:cNvPr id="6" name="Rectangle 5"/>
+          <p:cNvSpPr/>
+          <p:nvPr/>
+        </p:nvSpPr>
+        <p:spPr>
+          <a:xfrm>
+            <a:off x="7340596" y="1934629"/>
+            <a:ext cx="2988733" cy="1515533"/>
+          </a:xfrm>
+          <a:prstGeom prst="rect">
+            <a:avLst/>
+          </a:prstGeom>
+          <a:solidFill>
+            <a:schemeClr val="tx1"/>
+          </a:solidFill>
+          <a:ln>
+            <a:noFill/>
+          </a:ln>
+          <a:effectLst>
+            <a:outerShdw blurRad="76200" dir="18900000" sy="23000" kx="-1200000" algn="bl" rotWithShape="0">
+              <a:prstClr val="black">
+                <a:alpha val="20000"/>
+              </a:prstClr>
+            </a:outerShdw>
+          </a:effectLst>
+        </p:spPr>
+        <p:style>
+          <a:lnRef idx="2">
+            <a:schemeClr val="accent1">
+              <a:shade val="50000"/>
+            </a:schemeClr>
+          </a:lnRef>
+          <a:fillRef idx="1">
+            <a:schemeClr val="accent1"/>
+          </a:fillRef>
+          <a:effectRef idx="0">
+            <a:schemeClr val="accent1"/>
+          </a:effectRef>
+          <a:fontRef idx="minor">
+            <a:schemeClr val="lt1"/>
+          </a:fontRef>
+        </p:style>
+        <p:txBody>
+          <a:bodyPr rtlCol="0" anchor="ctr"/>
+          <a:lstStyle/>
+          <a:p>
+            <a:pPr marL="0" marR="0" lvl="0" indent="0" algn="ctr" defTabSz="457200" rtl="0" eaLnBrk="1" fontAlgn="auto" latinLnBrk="0" hangingPunct="1">
+              <a:lnSpc>
+                <a:spcPct val="100000"/>
+              </a:lnSpc>
+              <a:spcBef>
+                <a:spcPts val="0"/>
+              </a:spcBef>
+              <a:spcAft>
+                <a:spcPts val="0"/>
+              </a:spcAft>
+              <a:buClrTx/>
+              <a:buSzTx/>
+              <a:buFontTx/>
+              <a:buNone/>
+              <a:tabLst/>
+              <a:defRPr/>
+            </a:pPr>
+            <a:r>
+              <a:rPr kumimoji="0" lang="en-US" sz="1800" b="1" i="0" u="none" strike="noStrike" kern="1200" cap="none" spc="0" normalizeH="0" baseline="0" noProof="0" dirty="0" smtClean="0">
+                <a:ln>
+                  <a:noFill/>
+                </a:ln>
+                <a:solidFill>
+                  <a:prstClr val="black"/>
+                </a:solidFill>
+                <a:effectLst/>
+                <a:uLnTx/>
+                <a:uFillTx/>
+                <a:latin typeface="Palatino Linotype" panose="02040502050505030304"/>
+                <a:ea typeface="+mn-ea"/>
+                <a:cs typeface="+mn-cs"/>
+              </a:rPr>
+              <a:t>Server-side: </a:t>
+            </a:r>
+            <a:r>
+              <a:rPr kumimoji="0" lang="en-US" sz="1800" b="0" i="0" u="none" strike="noStrike" kern="1200" cap="none" spc="0" normalizeH="0" baseline="0" noProof="0" dirty="0" smtClean="0">
+                <a:ln>
+                  <a:noFill/>
+                </a:ln>
+                <a:solidFill>
+                  <a:prstClr val="black"/>
+                </a:solidFill>
+                <a:effectLst/>
+                <a:uLnTx/>
+                <a:uFillTx/>
+                <a:latin typeface="Palatino Linotype" panose="02040502050505030304"/>
+                <a:ea typeface="+mn-ea"/>
+                <a:cs typeface="+mn-cs"/>
+              </a:rPr>
+              <a:t>the physical location of the technology that interfaces between the data and client.</a:t>
+            </a:r>
+            <a:endParaRPr kumimoji="0" lang="en-US" sz="1800" b="1" i="0" u="none" strike="noStrike" kern="1200" cap="none" spc="0" normalizeH="0" baseline="0" noProof="0" dirty="0">
+              <a:ln>
+                <a:noFill/>
+              </a:ln>
+              <a:solidFill>
+                <a:prstClr val="black"/>
+              </a:solidFill>
+              <a:effectLst/>
+              <a:uLnTx/>
+              <a:uFillTx/>
+              <a:latin typeface="Palatino Linotype" panose="02040502050505030304"/>
+              <a:ea typeface="+mn-ea"/>
+              <a:cs typeface="+mn-cs"/>
+            </a:endParaRPr>
+          </a:p>
+        </p:txBody>
+      </p:sp>
+      <p:sp>
+        <p:nvSpPr>
+          <p:cNvPr id="7" name="Rectangle 6"/>
+          <p:cNvSpPr/>
+          <p:nvPr/>
+        </p:nvSpPr>
+        <p:spPr>
+          <a:xfrm>
+            <a:off x="7340595" y="4347629"/>
+            <a:ext cx="2988733" cy="1515533"/>
+          </a:xfrm>
+          <a:prstGeom prst="rect">
+            <a:avLst/>
+          </a:prstGeom>
+          <a:solidFill>
+            <a:schemeClr val="tx1"/>
+          </a:solidFill>
+          <a:ln>
+            <a:noFill/>
+          </a:ln>
+          <a:effectLst>
+            <a:outerShdw blurRad="76200" dir="18900000" sy="23000" kx="-1200000" algn="bl" rotWithShape="0">
+              <a:prstClr val="black">
+                <a:alpha val="20000"/>
+              </a:prstClr>
+            </a:outerShdw>
+          </a:effectLst>
+        </p:spPr>
+        <p:style>
+          <a:lnRef idx="2">
+            <a:schemeClr val="accent1">
+              <a:shade val="50000"/>
+            </a:schemeClr>
+          </a:lnRef>
+          <a:fillRef idx="1">
+            <a:schemeClr val="accent1"/>
+          </a:fillRef>
+          <a:effectRef idx="0">
+            <a:schemeClr val="accent1"/>
+          </a:effectRef>
+          <a:fontRef idx="minor">
+            <a:schemeClr val="lt1"/>
+          </a:fontRef>
+        </p:style>
+        <p:txBody>
+          <a:bodyPr rtlCol="0" anchor="ctr"/>
+          <a:lstStyle/>
+          <a:p>
+            <a:pPr marL="0" marR="0" lvl="0" indent="0" algn="ctr" defTabSz="457200" rtl="0" eaLnBrk="1" fontAlgn="auto" latinLnBrk="0" hangingPunct="1">
+              <a:lnSpc>
+                <a:spcPct val="100000"/>
+              </a:lnSpc>
+              <a:spcBef>
+                <a:spcPts val="0"/>
+              </a:spcBef>
+              <a:spcAft>
+                <a:spcPts val="0"/>
+              </a:spcAft>
+              <a:buClrTx/>
+              <a:buSzTx/>
+              <a:buFontTx/>
+              <a:buNone/>
+              <a:tabLst/>
+              <a:defRPr/>
+            </a:pPr>
+            <a:r>
+              <a:rPr kumimoji="0" lang="en-US" sz="1800" b="1" i="0" u="none" strike="noStrike" kern="1200" cap="none" spc="0" normalizeH="0" baseline="0" noProof="0" dirty="0" smtClean="0">
+                <a:ln>
+                  <a:noFill/>
+                </a:ln>
+                <a:solidFill>
+                  <a:prstClr val="black"/>
+                </a:solidFill>
+                <a:effectLst/>
+                <a:uLnTx/>
+                <a:uFillTx/>
+                <a:latin typeface="Palatino Linotype" panose="02040502050505030304"/>
+                <a:ea typeface="+mn-ea"/>
+                <a:cs typeface="+mn-cs"/>
+              </a:rPr>
+              <a:t>Database: </a:t>
+            </a:r>
+            <a:r>
+              <a:rPr kumimoji="0" lang="en-US" sz="1800" b="0" i="0" u="none" strike="noStrike" kern="1200" cap="none" spc="0" normalizeH="0" baseline="0" noProof="0" dirty="0" smtClean="0">
+                <a:ln>
+                  <a:noFill/>
+                </a:ln>
+                <a:solidFill>
+                  <a:prstClr val="black"/>
+                </a:solidFill>
+                <a:effectLst/>
+                <a:uLnTx/>
+                <a:uFillTx/>
+                <a:latin typeface="Palatino Linotype" panose="02040502050505030304"/>
+                <a:ea typeface="+mn-ea"/>
+                <a:cs typeface="+mn-cs"/>
+              </a:rPr>
+              <a:t>the physical location of the technology that handles data storage</a:t>
+            </a:r>
+            <a:endParaRPr kumimoji="0" lang="en-US" sz="1800" b="0" i="0" u="none" strike="noStrike" kern="1200" cap="none" spc="0" normalizeH="0" baseline="0" noProof="0" dirty="0">
+              <a:ln>
+                <a:noFill/>
+              </a:ln>
+              <a:solidFill>
+                <a:prstClr val="black"/>
+              </a:solidFill>
+              <a:effectLst/>
+              <a:uLnTx/>
+              <a:uFillTx/>
+              <a:latin typeface="Palatino Linotype" panose="02040502050505030304"/>
+              <a:ea typeface="+mn-ea"/>
+              <a:cs typeface="+mn-cs"/>
+            </a:endParaRPr>
+          </a:p>
+        </p:txBody>
+      </p:sp>
+      <p:cxnSp>
+        <p:nvCxnSpPr>
+          <p:cNvPr id="12" name="Straight Connector 11"/>
+          <p:cNvCxnSpPr>
+            <a:stCxn id="5" idx="3"/>
+          </p:cNvCxnSpPr>
+          <p:nvPr/>
+        </p:nvCxnSpPr>
+        <p:spPr>
+          <a:xfrm>
+            <a:off x="6341529" y="3818463"/>
+            <a:ext cx="2497671" cy="16937"/>
+          </a:xfrm>
+          <a:prstGeom prst="line">
+            <a:avLst/>
+          </a:prstGeom>
+          <a:ln>
+            <a:solidFill>
+              <a:schemeClr val="tx1"/>
+            </a:solidFill>
+          </a:ln>
+        </p:spPr>
+        <p:style>
+          <a:lnRef idx="2">
+            <a:schemeClr val="dk1"/>
+          </a:lnRef>
+          <a:fillRef idx="0">
+            <a:schemeClr val="dk1"/>
+          </a:fillRef>
+          <a:effectRef idx="1">
+            <a:schemeClr val="dk1"/>
+          </a:effectRef>
+          <a:fontRef idx="minor">
+            <a:schemeClr val="tx1"/>
+          </a:fontRef>
+        </p:style>
+      </p:cxnSp>
+      <p:cxnSp>
+        <p:nvCxnSpPr>
+          <p:cNvPr id="17" name="Straight Connector 16"/>
+          <p:cNvCxnSpPr>
+            <a:stCxn id="6" idx="2"/>
+            <a:endCxn id="7" idx="0"/>
+          </p:cNvCxnSpPr>
+          <p:nvPr/>
+        </p:nvCxnSpPr>
+        <p:spPr>
+          <a:xfrm flipH="1">
+            <a:off x="8834962" y="3450162"/>
+            <a:ext cx="1" cy="897467"/>
+          </a:xfrm>
+          <a:prstGeom prst="line">
+            <a:avLst/>
+          </a:prstGeom>
+          <a:ln>
+            <a:solidFill>
+              <a:schemeClr val="tx1"/>
+            </a:solidFill>
+          </a:ln>
+        </p:spPr>
+        <p:style>
+          <a:lnRef idx="2">
+            <a:schemeClr val="dk1"/>
+          </a:lnRef>
+          <a:fillRef idx="0">
+            <a:schemeClr val="dk1"/>
+          </a:fillRef>
+          <a:effectRef idx="1">
+            <a:schemeClr val="dk1"/>
+          </a:effectRef>
+          <a:fontRef idx="minor">
+            <a:schemeClr val="tx1"/>
+          </a:fontRef>
+        </p:style>
+      </p:cxnSp>
     </p:spTree>
     <p:extLst>
       <p:ext uri="{BB962C8B-B14F-4D97-AF65-F5344CB8AC3E}">
-        <p14:creationId xmlns:p14="http://schemas.microsoft.com/office/powerpoint/2010/main" val="3893485135"/>
+        <p14:creationId xmlns:p14="http://schemas.microsoft.com/office/powerpoint/2010/main" val="2572941698"/>
       </p:ext>
     </p:extLst>
   </p:cSld>

</xml_diff>